<commit_message>
Update user guides and README
Update user guides and README
</commit_message>
<xml_diff>
--- a/Phage Commander User Guide.pptx
+++ b/Phage Commander User Guide.pptx
@@ -12,9 +12,10 @@
     <p:sldId id="585" r:id="rId6"/>
     <p:sldId id="583" r:id="rId7"/>
     <p:sldId id="589" r:id="rId8"/>
-    <p:sldId id="588" r:id="rId9"/>
-    <p:sldId id="584" r:id="rId10"/>
-    <p:sldId id="582" r:id="rId11"/>
+    <p:sldId id="590" r:id="rId9"/>
+    <p:sldId id="588" r:id="rId10"/>
+    <p:sldId id="584" r:id="rId11"/>
+    <p:sldId id="582" r:id="rId12"/>
   </p:sldIdLst>
   <p:sldSz cx="12192000" cy="6858000"/>
   <p:notesSz cx="6858000" cy="9144000"/>
@@ -252,7 +253,7 @@
           <a:p>
             <a:fld id="{8635D198-6D19-4E30-930F-4865024DAF26}" type="datetimeFigureOut">
               <a:rPr lang="en-US" smtClean="0"/>
-              <a:t>2/4/2021</a:t>
+              <a:t>4/10/2021</a:t>
             </a:fld>
             <a:endParaRPr lang="en-US"/>
           </a:p>
@@ -422,7 +423,7 @@
           <a:p>
             <a:fld id="{8635D198-6D19-4E30-930F-4865024DAF26}" type="datetimeFigureOut">
               <a:rPr lang="en-US" smtClean="0"/>
-              <a:t>2/4/2021</a:t>
+              <a:t>4/10/2021</a:t>
             </a:fld>
             <a:endParaRPr lang="en-US"/>
           </a:p>
@@ -602,7 +603,7 @@
           <a:p>
             <a:fld id="{8635D198-6D19-4E30-930F-4865024DAF26}" type="datetimeFigureOut">
               <a:rPr lang="en-US" smtClean="0"/>
-              <a:t>2/4/2021</a:t>
+              <a:t>4/10/2021</a:t>
             </a:fld>
             <a:endParaRPr lang="en-US"/>
           </a:p>
@@ -772,7 +773,7 @@
           <a:p>
             <a:fld id="{8635D198-6D19-4E30-930F-4865024DAF26}" type="datetimeFigureOut">
               <a:rPr lang="en-US" smtClean="0"/>
-              <a:t>2/4/2021</a:t>
+              <a:t>4/10/2021</a:t>
             </a:fld>
             <a:endParaRPr lang="en-US"/>
           </a:p>
@@ -1016,7 +1017,7 @@
           <a:p>
             <a:fld id="{8635D198-6D19-4E30-930F-4865024DAF26}" type="datetimeFigureOut">
               <a:rPr lang="en-US" smtClean="0"/>
-              <a:t>2/4/2021</a:t>
+              <a:t>4/10/2021</a:t>
             </a:fld>
             <a:endParaRPr lang="en-US"/>
           </a:p>
@@ -1248,7 +1249,7 @@
           <a:p>
             <a:fld id="{8635D198-6D19-4E30-930F-4865024DAF26}" type="datetimeFigureOut">
               <a:rPr lang="en-US" smtClean="0"/>
-              <a:t>2/4/2021</a:t>
+              <a:t>4/10/2021</a:t>
             </a:fld>
             <a:endParaRPr lang="en-US"/>
           </a:p>
@@ -1615,7 +1616,7 @@
           <a:p>
             <a:fld id="{8635D198-6D19-4E30-930F-4865024DAF26}" type="datetimeFigureOut">
               <a:rPr lang="en-US" smtClean="0"/>
-              <a:t>2/4/2021</a:t>
+              <a:t>4/10/2021</a:t>
             </a:fld>
             <a:endParaRPr lang="en-US"/>
           </a:p>
@@ -1733,7 +1734,7 @@
           <a:p>
             <a:fld id="{8635D198-6D19-4E30-930F-4865024DAF26}" type="datetimeFigureOut">
               <a:rPr lang="en-US" smtClean="0"/>
-              <a:t>2/4/2021</a:t>
+              <a:t>4/10/2021</a:t>
             </a:fld>
             <a:endParaRPr lang="en-US"/>
           </a:p>
@@ -1828,7 +1829,7 @@
           <a:p>
             <a:fld id="{8635D198-6D19-4E30-930F-4865024DAF26}" type="datetimeFigureOut">
               <a:rPr lang="en-US" smtClean="0"/>
-              <a:t>2/4/2021</a:t>
+              <a:t>4/10/2021</a:t>
             </a:fld>
             <a:endParaRPr lang="en-US"/>
           </a:p>
@@ -2105,7 +2106,7 @@
           <a:p>
             <a:fld id="{8635D198-6D19-4E30-930F-4865024DAF26}" type="datetimeFigureOut">
               <a:rPr lang="en-US" smtClean="0"/>
-              <a:t>2/4/2021</a:t>
+              <a:t>4/10/2021</a:t>
             </a:fld>
             <a:endParaRPr lang="en-US"/>
           </a:p>
@@ -2362,7 +2363,7 @@
           <a:p>
             <a:fld id="{8635D198-6D19-4E30-930F-4865024DAF26}" type="datetimeFigureOut">
               <a:rPr lang="en-US" smtClean="0"/>
-              <a:t>2/4/2021</a:t>
+              <a:t>4/10/2021</a:t>
             </a:fld>
             <a:endParaRPr lang="en-US"/>
           </a:p>
@@ -2575,7 +2576,7 @@
           <a:p>
             <a:fld id="{8635D198-6D19-4E30-930F-4865024DAF26}" type="datetimeFigureOut">
               <a:rPr lang="en-US" smtClean="0"/>
-              <a:t>2/4/2021</a:t>
+              <a:t>4/10/2021</a:t>
             </a:fld>
             <a:endParaRPr lang="en-US"/>
           </a:p>
@@ -3040,16 +3041,16 @@
         </p:spPr>
         <p:txBody>
           <a:bodyPr>
-            <a:normAutofit fontScale="92500" lnSpcReduction="10000"/>
+            <a:normAutofit fontScale="92500" lnSpcReduction="20000"/>
           </a:bodyPr>
           <a:lstStyle/>
           <a:p>
             <a:r>
-              <a:rPr lang="en-US" b="1" dirty="0"/>
+              <a:rPr lang="en-US" sz="3000" b="1" dirty="0"/>
               <a:t>Phage Commander </a:t>
             </a:r>
             <a:r>
-              <a:rPr lang="en-US" dirty="0"/>
+              <a:rPr lang="en-US" sz="3000" dirty="0"/>
               <a:t>is a software tool for identifying genes in phage genomes</a:t>
             </a:r>
           </a:p>
@@ -3058,54 +3059,54 @@
           </a:p>
           <a:p>
             <a:r>
-              <a:rPr lang="en-US" dirty="0"/>
+              <a:rPr lang="en-US" sz="3000" dirty="0"/>
               <a:t>Phage Commander runs a phage’s DNA sequence through gene identification tools and outputs a list of potential genes. These tools include:</a:t>
             </a:r>
           </a:p>
           <a:p>
             <a:pPr lvl="1"/>
             <a:r>
-              <a:rPr lang="en-US" sz="2800" dirty="0"/>
+              <a:rPr lang="en-US" sz="3000" dirty="0"/>
               <a:t>Glimmer, </a:t>
             </a:r>
             <a:r>
-              <a:rPr lang="en-US" sz="2800" dirty="0" err="1"/>
+              <a:rPr lang="en-US" sz="3000" dirty="0" err="1"/>
               <a:t>Genemark</a:t>
             </a:r>
             <a:r>
-              <a:rPr lang="en-US" sz="2800" dirty="0"/>
+              <a:rPr lang="en-US" sz="3000" dirty="0"/>
               <a:t>, </a:t>
             </a:r>
             <a:r>
-              <a:rPr lang="en-US" sz="2800" dirty="0" err="1"/>
+              <a:rPr lang="en-US" sz="3000" dirty="0" err="1"/>
               <a:t>Genemark.hmm</a:t>
             </a:r>
             <a:r>
-              <a:rPr lang="en-US" sz="2800" dirty="0"/>
+              <a:rPr lang="en-US" sz="3000" dirty="0"/>
               <a:t>, </a:t>
             </a:r>
             <a:r>
-              <a:rPr lang="en-US" sz="2800" dirty="0" err="1"/>
+              <a:rPr lang="en-US" sz="3000" dirty="0" err="1"/>
               <a:t>Genemark</a:t>
             </a:r>
             <a:r>
-              <a:rPr lang="en-US" sz="2800" dirty="0"/>
+              <a:rPr lang="en-US" sz="3000" dirty="0"/>
               <a:t> S, </a:t>
             </a:r>
             <a:r>
-              <a:rPr lang="en-US" sz="2800" dirty="0" err="1"/>
+              <a:rPr lang="en-US" sz="3000" dirty="0" err="1"/>
               <a:t>Genemark</a:t>
             </a:r>
             <a:r>
-              <a:rPr lang="en-US" sz="2800" dirty="0"/>
+              <a:rPr lang="en-US" sz="3000" dirty="0"/>
               <a:t> S2, </a:t>
             </a:r>
             <a:r>
-              <a:rPr lang="en-US" sz="2800" dirty="0" err="1"/>
+              <a:rPr lang="en-US" sz="3000" dirty="0" err="1"/>
               <a:t>Genemark</a:t>
             </a:r>
             <a:r>
-              <a:rPr lang="en-US" sz="2800" dirty="0"/>
+              <a:rPr lang="en-US" sz="3000" dirty="0"/>
               <a:t> Heuristic, Prodigal, RAST, Metagene, and Aragorn (for tRNA genes)</a:t>
             </a:r>
           </a:p>
@@ -3114,7 +3115,7 @@
           </a:p>
           <a:p>
             <a:r>
-              <a:rPr lang="en-US" dirty="0"/>
+              <a:rPr lang="en-US" sz="3000" dirty="0"/>
               <a:t>Phage Commander’s output can be exported in Excel format (.xlsx) or NCBI GenBank format (.gb)</a:t>
             </a:r>
           </a:p>
@@ -3123,16 +3124,16 @@
           </a:p>
           <a:p>
             <a:r>
-              <a:rPr lang="en-US" dirty="0"/>
+              <a:rPr lang="en-US" sz="3000" dirty="0"/>
               <a:t>A draft paper describing Phage Commander in detail is here: </a:t>
             </a:r>
             <a:r>
-              <a:rPr lang="en-US" sz="2000" dirty="0">
+              <a:rPr lang="en-US" sz="3000" dirty="0">
                 <a:hlinkClick r:id="rId2"/>
               </a:rPr>
               <a:t>https://www.biorxiv.org/content/10.1101/2020.11.11.378802v1</a:t>
             </a:r>
-            <a:endParaRPr lang="en-US" sz="2000" dirty="0"/>
+            <a:endParaRPr lang="en-US" sz="3000" dirty="0"/>
           </a:p>
           <a:p>
             <a:endParaRPr lang="en-US" dirty="0"/>
@@ -3183,6 +3184,260 @@
           <p:cNvPr id="2" name="Title 1">
             <a:extLst>
               <a:ext uri="{FF2B5EF4-FFF2-40B4-BE49-F238E27FC236}">
+                <a16:creationId xmlns:a16="http://schemas.microsoft.com/office/drawing/2014/main" id="{25E2BFF6-6BAD-4146-AEAE-1A9B27A484BD}"/>
+              </a:ext>
+            </a:extLst>
+          </p:cNvPr>
+          <p:cNvSpPr>
+            <a:spLocks noGrp="1"/>
+          </p:cNvSpPr>
+          <p:nvPr>
+            <p:ph type="title"/>
+          </p:nvPr>
+        </p:nvSpPr>
+        <p:spPr>
+          <a:xfrm>
+            <a:off x="1719618" y="365127"/>
+            <a:ext cx="8775510" cy="1325563"/>
+          </a:xfrm>
+        </p:spPr>
+        <p:txBody>
+          <a:bodyPr>
+            <a:normAutofit/>
+          </a:bodyPr>
+          <a:lstStyle/>
+          <a:p>
+            <a:pPr algn="ctr"/>
+            <a:r>
+              <a:rPr lang="en-US" dirty="0"/>
+              <a:t>Exporting Phage Commander Results</a:t>
+            </a:r>
+          </a:p>
+        </p:txBody>
+      </p:sp>
+      <p:sp>
+        <p:nvSpPr>
+          <p:cNvPr id="3" name="Content Placeholder 2">
+            <a:extLst>
+              <a:ext uri="{FF2B5EF4-FFF2-40B4-BE49-F238E27FC236}">
+                <a16:creationId xmlns:a16="http://schemas.microsoft.com/office/drawing/2014/main" id="{CE8EA6EE-0E6C-4A9E-8B64-0F376EC4BF94}"/>
+              </a:ext>
+            </a:extLst>
+          </p:cNvPr>
+          <p:cNvSpPr>
+            <a:spLocks noGrp="1"/>
+          </p:cNvSpPr>
+          <p:nvPr>
+            <p:ph idx="1"/>
+          </p:nvPr>
+        </p:nvSpPr>
+        <p:spPr>
+          <a:xfrm>
+            <a:off x="512465" y="1600200"/>
+            <a:ext cx="11284299" cy="5160819"/>
+          </a:xfrm>
+        </p:spPr>
+        <p:txBody>
+          <a:bodyPr>
+            <a:normAutofit fontScale="92500" lnSpcReduction="10000"/>
+          </a:bodyPr>
+          <a:lstStyle/>
+          <a:p>
+            <a:r>
+              <a:rPr lang="en-US" sz="3200" dirty="0"/>
+              <a:t>To export as excel spreadsheet, select:</a:t>
+            </a:r>
+          </a:p>
+          <a:p>
+            <a:pPr lvl="1"/>
+            <a:r>
+              <a:rPr lang="en-US" sz="2800" b="1" dirty="0">
+                <a:solidFill>
+                  <a:srgbClr val="0070C0"/>
+                </a:solidFill>
+              </a:rPr>
+              <a:t>File</a:t>
+            </a:r>
+            <a:r>
+              <a:rPr lang="en-US" sz="2800" dirty="0"/>
+              <a:t> </a:t>
+            </a:r>
+            <a:r>
+              <a:rPr lang="en-US" sz="2800" dirty="0">
+                <a:sym typeface="Wingdings" panose="05000000000000000000" pitchFamily="2" charset="2"/>
+              </a:rPr>
+              <a:t> </a:t>
+            </a:r>
+            <a:r>
+              <a:rPr lang="en-US" sz="2800" b="1" dirty="0">
+                <a:solidFill>
+                  <a:srgbClr val="0070C0"/>
+                </a:solidFill>
+                <a:sym typeface="Wingdings" panose="05000000000000000000" pitchFamily="2" charset="2"/>
+              </a:rPr>
+              <a:t>Export</a:t>
+            </a:r>
+            <a:r>
+              <a:rPr lang="en-US" sz="2800" dirty="0">
+                <a:sym typeface="Wingdings" panose="05000000000000000000" pitchFamily="2" charset="2"/>
+              </a:rPr>
+              <a:t>  </a:t>
+            </a:r>
+            <a:r>
+              <a:rPr lang="en-US" sz="2800" b="1" dirty="0">
+                <a:solidFill>
+                  <a:srgbClr val="0070C0"/>
+                </a:solidFill>
+                <a:sym typeface="Wingdings" panose="05000000000000000000" pitchFamily="2" charset="2"/>
+              </a:rPr>
+              <a:t>Excel</a:t>
+            </a:r>
+          </a:p>
+          <a:p>
+            <a:r>
+              <a:rPr lang="en-US" sz="3200" dirty="0">
+                <a:sym typeface="Wingdings" panose="05000000000000000000" pitchFamily="2" charset="2"/>
+              </a:rPr>
+              <a:t>To export as GenBank (.</a:t>
+            </a:r>
+            <a:r>
+              <a:rPr lang="en-US" sz="3200" dirty="0" err="1">
+                <a:sym typeface="Wingdings" panose="05000000000000000000" pitchFamily="2" charset="2"/>
+              </a:rPr>
+              <a:t>gb</a:t>
+            </a:r>
+            <a:r>
+              <a:rPr lang="en-US" sz="3200" dirty="0">
+                <a:sym typeface="Wingdings" panose="05000000000000000000" pitchFamily="2" charset="2"/>
+              </a:rPr>
+              <a:t>) format file, select:</a:t>
+            </a:r>
+          </a:p>
+          <a:p>
+            <a:pPr lvl="1"/>
+            <a:r>
+              <a:rPr lang="en-US" sz="2800" b="1" dirty="0">
+                <a:solidFill>
+                  <a:srgbClr val="0070C0"/>
+                </a:solidFill>
+                <a:sym typeface="Wingdings" panose="05000000000000000000" pitchFamily="2" charset="2"/>
+              </a:rPr>
+              <a:t>File</a:t>
+            </a:r>
+            <a:r>
+              <a:rPr lang="en-US" sz="2800" dirty="0">
+                <a:sym typeface="Wingdings" panose="05000000000000000000" pitchFamily="2" charset="2"/>
+              </a:rPr>
+              <a:t>  </a:t>
+            </a:r>
+            <a:r>
+              <a:rPr lang="en-US" sz="2800" b="1" dirty="0">
+                <a:solidFill>
+                  <a:srgbClr val="0070C0"/>
+                </a:solidFill>
+                <a:sym typeface="Wingdings" panose="05000000000000000000" pitchFamily="2" charset="2"/>
+              </a:rPr>
+              <a:t>Export</a:t>
+            </a:r>
+            <a:r>
+              <a:rPr lang="en-US" sz="2800" dirty="0">
+                <a:sym typeface="Wingdings" panose="05000000000000000000" pitchFamily="2" charset="2"/>
+              </a:rPr>
+              <a:t>  </a:t>
+            </a:r>
+            <a:r>
+              <a:rPr lang="en-US" sz="2800" b="1" dirty="0">
+                <a:solidFill>
+                  <a:srgbClr val="0070C0"/>
+                </a:solidFill>
+                <a:sym typeface="Wingdings" panose="05000000000000000000" pitchFamily="2" charset="2"/>
+              </a:rPr>
+              <a:t>GenBank</a:t>
+            </a:r>
+          </a:p>
+          <a:p>
+            <a:pPr lvl="1"/>
+            <a:r>
+              <a:rPr lang="en-US" sz="2800" dirty="0">
+                <a:sym typeface="Wingdings" panose="05000000000000000000" pitchFamily="2" charset="2"/>
+              </a:rPr>
+              <a:t>Set the threshold number of programs for exporting genes </a:t>
+            </a:r>
+          </a:p>
+          <a:p>
+            <a:pPr lvl="1"/>
+            <a:r>
+              <a:rPr lang="en-US" sz="2800" dirty="0">
+                <a:sym typeface="Wingdings" panose="05000000000000000000" pitchFamily="2" charset="2"/>
+              </a:rPr>
+              <a:t>“Less than or equal to” will export those genes identified by an equal or lower number of programs than the threshold (e.g. genes identified by 3 or fewer programs. Set the threshold to maximum to export all genes identified)</a:t>
+            </a:r>
+          </a:p>
+          <a:p>
+            <a:pPr lvl="1"/>
+            <a:r>
+              <a:rPr lang="en-US" sz="2800" dirty="0">
+                <a:sym typeface="Wingdings" panose="05000000000000000000" pitchFamily="2" charset="2"/>
+              </a:rPr>
+              <a:t>“Greater than” will export those genes identified by a number of programs greater than the threshold (e.g. genes identified by more than 2 programs. Use “0” as the threshold and this setting to export all genes identified)</a:t>
+            </a:r>
+          </a:p>
+          <a:p>
+            <a:pPr lvl="1"/>
+            <a:r>
+              <a:rPr lang="en-US" sz="2800" dirty="0">
+                <a:sym typeface="Wingdings" panose="05000000000000000000" pitchFamily="2" charset="2"/>
+              </a:rPr>
+              <a:t>Press “Save as” and enter desired filename</a:t>
+            </a:r>
+          </a:p>
+          <a:p>
+            <a:pPr lvl="1"/>
+            <a:r>
+              <a:rPr lang="en-US" sz="2800" dirty="0">
+                <a:sym typeface="Wingdings" panose="05000000000000000000" pitchFamily="2" charset="2"/>
+              </a:rPr>
+              <a:t>Press “Export”</a:t>
+            </a:r>
+            <a:endParaRPr lang="en-US" sz="2800" dirty="0"/>
+          </a:p>
+        </p:txBody>
+      </p:sp>
+    </p:spTree>
+    <p:extLst>
+      <p:ext uri="{BB962C8B-B14F-4D97-AF65-F5344CB8AC3E}">
+        <p14:creationId xmlns:p14="http://schemas.microsoft.com/office/powerpoint/2010/main" val="2722560293"/>
+      </p:ext>
+    </p:extLst>
+  </p:cSld>
+  <p:clrMapOvr>
+    <a:masterClrMapping/>
+  </p:clrMapOvr>
+</p:sld>
+</file>
+
+<file path=ppt/slides/slide11.xml><?xml version="1.0" encoding="utf-8"?>
+<p:sld xmlns:a="http://schemas.openxmlformats.org/drawingml/2006/main" xmlns:r="http://schemas.openxmlformats.org/officeDocument/2006/relationships" xmlns:p="http://schemas.openxmlformats.org/presentationml/2006/main">
+  <p:cSld>
+    <p:spTree>
+      <p:nvGrpSpPr>
+        <p:cNvPr id="1" name=""/>
+        <p:cNvGrpSpPr/>
+        <p:nvPr/>
+      </p:nvGrpSpPr>
+      <p:grpSpPr>
+        <a:xfrm>
+          <a:off x="0" y="0"/>
+          <a:ext cx="0" cy="0"/>
+          <a:chOff x="0" y="0"/>
+          <a:chExt cx="0" cy="0"/>
+        </a:xfrm>
+      </p:grpSpPr>
+      <p:sp>
+        <p:nvSpPr>
+          <p:cNvPr id="2" name="Title 1">
+            <a:extLst>
+              <a:ext uri="{FF2B5EF4-FFF2-40B4-BE49-F238E27FC236}">
                 <a16:creationId xmlns:a16="http://schemas.microsoft.com/office/drawing/2014/main" id="{5E06BCFD-87C4-42CF-998C-E7326095EE1B}"/>
               </a:ext>
             </a:extLst>
@@ -3282,7 +3537,7 @@
                   <a:srgbClr val="FF0000"/>
                 </a:solidFill>
               </a:rPr>
-              <a:t>For gene exporting</a:t>
+              <a:t>for exporting genes</a:t>
             </a:r>
           </a:p>
         </p:txBody>
@@ -3365,7 +3620,7 @@
                   <a:srgbClr val="FF0000"/>
                 </a:solidFill>
               </a:rPr>
-              <a:t>Export genes identified by  less than or equal the set number of programs</a:t>
+              <a:t>Export genes identified by no more than the set number of programs</a:t>
             </a:r>
           </a:p>
         </p:txBody>
@@ -3614,7 +3869,7 @@
                   <a:srgbClr val="FF0000"/>
                 </a:solidFill>
               </a:rPr>
-              <a:t>Export genes identified by  more than the set number of programs</a:t>
+              <a:t>Export genes identified by  at least the set number of programs</a:t>
             </a:r>
           </a:p>
         </p:txBody>
@@ -3697,7 +3952,7 @@
                   <a:srgbClr val="FF0000"/>
                 </a:solidFill>
               </a:rPr>
-              <a:t>Export genes identified only by set number of programs</a:t>
+              <a:t>Export genes identified exactly by the set number of programs</a:t>
             </a:r>
           </a:p>
         </p:txBody>
@@ -3761,7 +4016,7 @@
         <p:spPr>
           <a:xfrm>
             <a:off x="8986984" y="1379138"/>
-            <a:ext cx="2121679" cy="923330"/>
+            <a:ext cx="2121679" cy="1200329"/>
           </a:xfrm>
           <a:prstGeom prst="rect">
             <a:avLst/>
@@ -3796,7 +4051,7 @@
                   <a:srgbClr val="FF0000"/>
                 </a:solidFill>
               </a:rPr>
-              <a:t> programs (max)</a:t>
+              <a:t> programs (most stringent)</a:t>
             </a:r>
           </a:p>
         </p:txBody>
@@ -3859,8 +4114,8 @@
         </p:nvSpPr>
         <p:spPr>
           <a:xfrm>
-            <a:off x="9034123" y="2738850"/>
-            <a:ext cx="2072655" cy="923330"/>
+            <a:off x="9039256" y="3108720"/>
+            <a:ext cx="2698440" cy="923330"/>
           </a:xfrm>
           <a:prstGeom prst="rect">
             <a:avLst/>
@@ -3889,7 +4144,7 @@
                   <a:srgbClr val="FF0000"/>
                 </a:solidFill>
               </a:rPr>
-              <a:t>only </a:t>
+              <a:t>at least </a:t>
             </a:r>
             <a:r>
               <a:rPr lang="en-US" b="1" u="sng" dirty="0">
@@ -3905,7 +4160,23 @@
                   <a:srgbClr val="FF0000"/>
                 </a:solidFill>
               </a:rPr>
-              <a:t> program</a:t>
+              <a:t> program (i.e. all genes, least </a:t>
+            </a:r>
+            <a:r>
+              <a:rPr lang="en-US" b="1" dirty="0" err="1">
+                <a:solidFill>
+                  <a:srgbClr val="FF0000"/>
+                </a:solidFill>
+              </a:rPr>
+              <a:t>stringen</a:t>
+            </a:r>
+            <a:r>
+              <a:rPr lang="en-US" b="1" dirty="0">
+                <a:solidFill>
+                  <a:srgbClr val="FF0000"/>
+                </a:solidFill>
+              </a:rPr>
+              <a:t>)</a:t>
             </a:r>
           </a:p>
         </p:txBody>
@@ -3926,8 +4197,8 @@
         </p:nvCxnSpPr>
         <p:spPr>
           <a:xfrm flipH="1">
-            <a:off x="6423907" y="3335524"/>
-            <a:ext cx="2574231" cy="589631"/>
+            <a:off x="6423908" y="3662180"/>
+            <a:ext cx="2523450" cy="262975"/>
           </a:xfrm>
           <a:prstGeom prst="straightConnector1">
             <a:avLst/>
@@ -5029,33 +5300,6 @@
           <a:chExt cx="0" cy="0"/>
         </a:xfrm>
       </p:grpSpPr>
-      <p:pic>
-        <p:nvPicPr>
-          <p:cNvPr id="5" name="Content Placeholder 4">
-            <a:extLst>
-              <a:ext uri="{FF2B5EF4-FFF2-40B4-BE49-F238E27FC236}">
-                <a16:creationId xmlns:a16="http://schemas.microsoft.com/office/drawing/2014/main" id="{BC699DAC-BE9A-4E7B-BCE3-B40915C55F02}"/>
-              </a:ext>
-            </a:extLst>
-          </p:cNvPr>
-          <p:cNvPicPr>
-            <a:picLocks noGrp="1" noChangeAspect="1"/>
-          </p:cNvPicPr>
-          <p:nvPr>
-            <p:ph idx="1"/>
-          </p:nvPr>
-        </p:nvPicPr>
-        <p:blipFill rotWithShape="1">
-          <a:blip r:embed="rId2"/>
-          <a:stretch/>
-        </p:blipFill>
-        <p:spPr>
-          <a:xfrm>
-            <a:off x="2079380" y="1825625"/>
-            <a:ext cx="8033239" cy="4351338"/>
-          </a:xfrm>
-        </p:spPr>
-      </p:pic>
       <p:sp>
         <p:nvSpPr>
           <p:cNvPr id="8" name="TextBox 7">
@@ -5070,8 +5314,8 @@
         </p:nvSpPr>
         <p:spPr>
           <a:xfrm>
-            <a:off x="1787239" y="117633"/>
-            <a:ext cx="2193337" cy="1200329"/>
+            <a:off x="48716" y="-24251"/>
+            <a:ext cx="2796830" cy="923330"/>
           </a:xfrm>
           <a:prstGeom prst="rect">
             <a:avLst/>
@@ -5105,12 +5349,256 @@
           </a:p>
         </p:txBody>
       </p:sp>
+      <p:sp>
+        <p:nvSpPr>
+          <p:cNvPr id="13" name="TextBox 12">
+            <a:extLst>
+              <a:ext uri="{FF2B5EF4-FFF2-40B4-BE49-F238E27FC236}">
+                <a16:creationId xmlns:a16="http://schemas.microsoft.com/office/drawing/2014/main" id="{65E2A346-CBBB-41B5-98AE-D394F69D0BB8}"/>
+              </a:ext>
+            </a:extLst>
+          </p:cNvPr>
+          <p:cNvSpPr txBox="1"/>
+          <p:nvPr/>
+        </p:nvSpPr>
+        <p:spPr>
+          <a:xfrm>
+            <a:off x="2563173" y="644841"/>
+            <a:ext cx="1946786" cy="646331"/>
+          </a:xfrm>
+          <a:prstGeom prst="rect">
+            <a:avLst/>
+          </a:prstGeom>
+          <a:noFill/>
+        </p:spPr>
+        <p:txBody>
+          <a:bodyPr wrap="square" rtlCol="0">
+            <a:spAutoFit/>
+          </a:bodyPr>
+          <a:lstStyle/>
+          <a:p>
+            <a:r>
+              <a:rPr lang="en-US" b="1" dirty="0">
+                <a:solidFill>
+                  <a:srgbClr val="FF0000"/>
+                </a:solidFill>
+              </a:rPr>
+              <a:t>Genes identified by GeneMark</a:t>
+            </a:r>
+          </a:p>
+        </p:txBody>
+      </p:sp>
+      <p:sp>
+        <p:nvSpPr>
+          <p:cNvPr id="15" name="TextBox 14">
+            <a:extLst>
+              <a:ext uri="{FF2B5EF4-FFF2-40B4-BE49-F238E27FC236}">
+                <a16:creationId xmlns:a16="http://schemas.microsoft.com/office/drawing/2014/main" id="{5E747C8D-AD30-4397-A776-BA6B525DE67F}"/>
+              </a:ext>
+            </a:extLst>
+          </p:cNvPr>
+          <p:cNvSpPr txBox="1"/>
+          <p:nvPr/>
+        </p:nvSpPr>
+        <p:spPr>
+          <a:xfrm>
+            <a:off x="4386122" y="644840"/>
+            <a:ext cx="2030361" cy="646331"/>
+          </a:xfrm>
+          <a:prstGeom prst="rect">
+            <a:avLst/>
+          </a:prstGeom>
+          <a:noFill/>
+        </p:spPr>
+        <p:txBody>
+          <a:bodyPr wrap="square" rtlCol="0">
+            <a:spAutoFit/>
+          </a:bodyPr>
+          <a:lstStyle/>
+          <a:p>
+            <a:r>
+              <a:rPr lang="en-US" b="1" dirty="0">
+                <a:solidFill>
+                  <a:srgbClr val="FF0000"/>
+                </a:solidFill>
+              </a:rPr>
+              <a:t>Genes identified by GeneMark.hmm</a:t>
+            </a:r>
+          </a:p>
+        </p:txBody>
+      </p:sp>
+      <p:sp>
+        <p:nvSpPr>
+          <p:cNvPr id="19" name="TextBox 18">
+            <a:extLst>
+              <a:ext uri="{FF2B5EF4-FFF2-40B4-BE49-F238E27FC236}">
+                <a16:creationId xmlns:a16="http://schemas.microsoft.com/office/drawing/2014/main" id="{CE8D919F-823D-4B09-BAD2-E988E85E6C57}"/>
+              </a:ext>
+            </a:extLst>
+          </p:cNvPr>
+          <p:cNvSpPr txBox="1"/>
+          <p:nvPr/>
+        </p:nvSpPr>
+        <p:spPr>
+          <a:xfrm>
+            <a:off x="0" y="2228671"/>
+            <a:ext cx="1946786" cy="646331"/>
+          </a:xfrm>
+          <a:prstGeom prst="rect">
+            <a:avLst/>
+          </a:prstGeom>
+          <a:noFill/>
+        </p:spPr>
+        <p:txBody>
+          <a:bodyPr wrap="square" rtlCol="0">
+            <a:spAutoFit/>
+          </a:bodyPr>
+          <a:lstStyle/>
+          <a:p>
+            <a:r>
+              <a:rPr lang="en-US" b="1" dirty="0">
+                <a:solidFill>
+                  <a:srgbClr val="FF0000"/>
+                </a:solidFill>
+              </a:rPr>
+              <a:t>Each row</a:t>
+            </a:r>
+          </a:p>
+          <a:p>
+            <a:r>
+              <a:rPr lang="en-US" b="1" dirty="0">
+                <a:solidFill>
+                  <a:srgbClr val="FF0000"/>
+                </a:solidFill>
+              </a:rPr>
+              <a:t> is a gene</a:t>
+            </a:r>
+          </a:p>
+        </p:txBody>
+      </p:sp>
+      <p:pic>
+        <p:nvPicPr>
+          <p:cNvPr id="29" name="Picture 28">
+            <a:extLst>
+              <a:ext uri="{FF2B5EF4-FFF2-40B4-BE49-F238E27FC236}">
+                <a16:creationId xmlns:a16="http://schemas.microsoft.com/office/drawing/2014/main" id="{157CB1E5-483D-4481-99A4-8E67CACAFEF6}"/>
+              </a:ext>
+            </a:extLst>
+          </p:cNvPr>
+          <p:cNvPicPr>
+            <a:picLocks noChangeAspect="1"/>
+          </p:cNvPicPr>
+          <p:nvPr/>
+        </p:nvPicPr>
+        <p:blipFill rotWithShape="1">
+          <a:blip r:embed="rId2"/>
+          <a:srcRect r="49840" b="36316"/>
+          <a:stretch/>
+        </p:blipFill>
+        <p:spPr>
+          <a:xfrm>
+            <a:off x="1106775" y="1277105"/>
+            <a:ext cx="9978450" cy="5302882"/>
+          </a:xfrm>
+          <a:prstGeom prst="rect">
+            <a:avLst/>
+          </a:prstGeom>
+        </p:spPr>
+      </p:pic>
+      <p:sp>
+        <p:nvSpPr>
+          <p:cNvPr id="32" name="TextBox 31">
+            <a:extLst>
+              <a:ext uri="{FF2B5EF4-FFF2-40B4-BE49-F238E27FC236}">
+                <a16:creationId xmlns:a16="http://schemas.microsoft.com/office/drawing/2014/main" id="{432A548A-43C7-42A8-A792-2E77854B454C}"/>
+              </a:ext>
+            </a:extLst>
+          </p:cNvPr>
+          <p:cNvSpPr txBox="1"/>
+          <p:nvPr/>
+        </p:nvSpPr>
+        <p:spPr>
+          <a:xfrm>
+            <a:off x="6459681" y="656776"/>
+            <a:ext cx="2127153" cy="646331"/>
+          </a:xfrm>
+          <a:prstGeom prst="rect">
+            <a:avLst/>
+          </a:prstGeom>
+          <a:noFill/>
+        </p:spPr>
+        <p:txBody>
+          <a:bodyPr wrap="square" rtlCol="0">
+            <a:spAutoFit/>
+          </a:bodyPr>
+          <a:lstStyle/>
+          <a:p>
+            <a:r>
+              <a:rPr lang="en-US" b="1" dirty="0">
+                <a:solidFill>
+                  <a:srgbClr val="FF0000"/>
+                </a:solidFill>
+              </a:rPr>
+              <a:t>Genes identified by GeneMark Heuristic</a:t>
+            </a:r>
+          </a:p>
+        </p:txBody>
+      </p:sp>
+      <p:sp>
+        <p:nvSpPr>
+          <p:cNvPr id="33" name="TextBox 32">
+            <a:extLst>
+              <a:ext uri="{FF2B5EF4-FFF2-40B4-BE49-F238E27FC236}">
+                <a16:creationId xmlns:a16="http://schemas.microsoft.com/office/drawing/2014/main" id="{091A11B5-78DB-4945-856A-C6988F7C4320}"/>
+              </a:ext>
+            </a:extLst>
+          </p:cNvPr>
+          <p:cNvSpPr txBox="1"/>
+          <p:nvPr/>
+        </p:nvSpPr>
+        <p:spPr>
+          <a:xfrm>
+            <a:off x="8772453" y="644840"/>
+            <a:ext cx="2127153" cy="646331"/>
+          </a:xfrm>
+          <a:prstGeom prst="rect">
+            <a:avLst/>
+          </a:prstGeom>
+          <a:noFill/>
+        </p:spPr>
+        <p:txBody>
+          <a:bodyPr wrap="square" rtlCol="0">
+            <a:spAutoFit/>
+          </a:bodyPr>
+          <a:lstStyle/>
+          <a:p>
+            <a:r>
+              <a:rPr lang="en-US" b="1" dirty="0">
+                <a:solidFill>
+                  <a:srgbClr val="FF0000"/>
+                </a:solidFill>
+              </a:rPr>
+              <a:t>Genes identified </a:t>
+            </a:r>
+          </a:p>
+          <a:p>
+            <a:r>
+              <a:rPr lang="en-US" b="1" dirty="0">
+                <a:solidFill>
+                  <a:srgbClr val="FF0000"/>
+                </a:solidFill>
+              </a:rPr>
+              <a:t>by GeneMark S</a:t>
+            </a:r>
+          </a:p>
+        </p:txBody>
+      </p:sp>
       <p:cxnSp>
         <p:nvCxnSpPr>
-          <p:cNvPr id="9" name="Straight Arrow Connector 8">
+          <p:cNvPr id="18" name="Straight Arrow Connector 17">
             <a:extLst>
               <a:ext uri="{FF2B5EF4-FFF2-40B4-BE49-F238E27FC236}">
-                <a16:creationId xmlns:a16="http://schemas.microsoft.com/office/drawing/2014/main" id="{A12F170E-BC3C-465A-88BE-474424CFB0DF}"/>
+                <a16:creationId xmlns:a16="http://schemas.microsoft.com/office/drawing/2014/main" id="{9B73B8D2-DBAD-48B9-B3F0-B89CAEADB73D}"/>
               </a:ext>
             </a:extLst>
           </p:cNvPr>
@@ -5121,8 +5609,8 @@
         </p:nvCxnSpPr>
         <p:spPr>
           <a:xfrm>
-            <a:off x="2212854" y="1317961"/>
-            <a:ext cx="0" cy="741748"/>
+            <a:off x="889371" y="814622"/>
+            <a:ext cx="459138" cy="626251"/>
           </a:xfrm>
           <a:prstGeom prst="straightConnector1">
             <a:avLst/>
@@ -5149,333 +5637,6 @@
           </a:fontRef>
         </p:style>
       </p:cxnSp>
-      <p:sp>
-        <p:nvSpPr>
-          <p:cNvPr id="13" name="TextBox 12">
-            <a:extLst>
-              <a:ext uri="{FF2B5EF4-FFF2-40B4-BE49-F238E27FC236}">
-                <a16:creationId xmlns:a16="http://schemas.microsoft.com/office/drawing/2014/main" id="{65E2A346-CBBB-41B5-98AE-D394F69D0BB8}"/>
-              </a:ext>
-            </a:extLst>
-          </p:cNvPr>
-          <p:cNvSpPr txBox="1"/>
-          <p:nvPr/>
-        </p:nvSpPr>
-        <p:spPr>
-          <a:xfrm>
-            <a:off x="3962400" y="254692"/>
-            <a:ext cx="1946786" cy="923330"/>
-          </a:xfrm>
-          <a:prstGeom prst="rect">
-            <a:avLst/>
-          </a:prstGeom>
-          <a:noFill/>
-        </p:spPr>
-        <p:txBody>
-          <a:bodyPr wrap="square" rtlCol="0">
-            <a:spAutoFit/>
-          </a:bodyPr>
-          <a:lstStyle/>
-          <a:p>
-            <a:r>
-              <a:rPr lang="en-US" b="1" dirty="0">
-                <a:solidFill>
-                  <a:srgbClr val="FF0000"/>
-                </a:solidFill>
-              </a:rPr>
-              <a:t>“GM” is the genes identified by GeneMark</a:t>
-            </a:r>
-          </a:p>
-        </p:txBody>
-      </p:sp>
-      <p:cxnSp>
-        <p:nvCxnSpPr>
-          <p:cNvPr id="14" name="Straight Arrow Connector 13">
-            <a:extLst>
-              <a:ext uri="{FF2B5EF4-FFF2-40B4-BE49-F238E27FC236}">
-                <a16:creationId xmlns:a16="http://schemas.microsoft.com/office/drawing/2014/main" id="{A02B246A-0C7E-43B8-97F7-83AEB2DBA1E5}"/>
-              </a:ext>
-            </a:extLst>
-          </p:cNvPr>
-          <p:cNvCxnSpPr>
-            <a:cxnSpLocks/>
-          </p:cNvCxnSpPr>
-          <p:nvPr/>
-        </p:nvCxnSpPr>
-        <p:spPr>
-          <a:xfrm>
-            <a:off x="4605823" y="1134743"/>
-            <a:ext cx="0" cy="924966"/>
-          </a:xfrm>
-          <a:prstGeom prst="straightConnector1">
-            <a:avLst/>
-          </a:prstGeom>
-          <a:ln w="57150">
-            <a:solidFill>
-              <a:srgbClr val="FF0000"/>
-            </a:solidFill>
-            <a:tailEnd type="triangle"/>
-          </a:ln>
-        </p:spPr>
-        <p:style>
-          <a:lnRef idx="1">
-            <a:schemeClr val="accent1"/>
-          </a:lnRef>
-          <a:fillRef idx="0">
-            <a:schemeClr val="accent1"/>
-          </a:fillRef>
-          <a:effectRef idx="0">
-            <a:schemeClr val="accent1"/>
-          </a:effectRef>
-          <a:fontRef idx="minor">
-            <a:schemeClr val="tx1"/>
-          </a:fontRef>
-        </p:style>
-      </p:cxnSp>
-      <p:sp>
-        <p:nvSpPr>
-          <p:cNvPr id="15" name="TextBox 14">
-            <a:extLst>
-              <a:ext uri="{FF2B5EF4-FFF2-40B4-BE49-F238E27FC236}">
-                <a16:creationId xmlns:a16="http://schemas.microsoft.com/office/drawing/2014/main" id="{5E747C8D-AD30-4397-A776-BA6B525DE67F}"/>
-              </a:ext>
-            </a:extLst>
-          </p:cNvPr>
-          <p:cNvSpPr txBox="1"/>
-          <p:nvPr/>
-        </p:nvSpPr>
-        <p:spPr>
-          <a:xfrm>
-            <a:off x="6100918" y="254692"/>
-            <a:ext cx="2030361" cy="923330"/>
-          </a:xfrm>
-          <a:prstGeom prst="rect">
-            <a:avLst/>
-          </a:prstGeom>
-          <a:noFill/>
-        </p:spPr>
-        <p:txBody>
-          <a:bodyPr wrap="square" rtlCol="0">
-            <a:spAutoFit/>
-          </a:bodyPr>
-          <a:lstStyle/>
-          <a:p>
-            <a:r>
-              <a:rPr lang="en-US" b="1" dirty="0">
-                <a:solidFill>
-                  <a:srgbClr val="FF0000"/>
-                </a:solidFill>
-              </a:rPr>
-              <a:t>“HMM” is the genes identified by GeneMark.hmm</a:t>
-            </a:r>
-          </a:p>
-        </p:txBody>
-      </p:sp>
-      <p:cxnSp>
-        <p:nvCxnSpPr>
-          <p:cNvPr id="16" name="Straight Arrow Connector 15">
-            <a:extLst>
-              <a:ext uri="{FF2B5EF4-FFF2-40B4-BE49-F238E27FC236}">
-                <a16:creationId xmlns:a16="http://schemas.microsoft.com/office/drawing/2014/main" id="{EBB5CC87-28D4-40C7-8C8E-006D73B79A8D}"/>
-              </a:ext>
-            </a:extLst>
-          </p:cNvPr>
-          <p:cNvCxnSpPr>
-            <a:cxnSpLocks/>
-          </p:cNvCxnSpPr>
-          <p:nvPr/>
-        </p:nvCxnSpPr>
-        <p:spPr>
-          <a:xfrm>
-            <a:off x="6453538" y="1125437"/>
-            <a:ext cx="0" cy="934273"/>
-          </a:xfrm>
-          <a:prstGeom prst="straightConnector1">
-            <a:avLst/>
-          </a:prstGeom>
-          <a:ln w="57150">
-            <a:solidFill>
-              <a:srgbClr val="FF0000"/>
-            </a:solidFill>
-            <a:tailEnd type="triangle"/>
-          </a:ln>
-        </p:spPr>
-        <p:style>
-          <a:lnRef idx="1">
-            <a:schemeClr val="accent1"/>
-          </a:lnRef>
-          <a:fillRef idx="0">
-            <a:schemeClr val="accent1"/>
-          </a:fillRef>
-          <a:effectRef idx="0">
-            <a:schemeClr val="accent1"/>
-          </a:effectRef>
-          <a:fontRef idx="minor">
-            <a:schemeClr val="tx1"/>
-          </a:fontRef>
-        </p:style>
-      </p:cxnSp>
-      <p:sp>
-        <p:nvSpPr>
-          <p:cNvPr id="17" name="TextBox 16">
-            <a:extLst>
-              <a:ext uri="{FF2B5EF4-FFF2-40B4-BE49-F238E27FC236}">
-                <a16:creationId xmlns:a16="http://schemas.microsoft.com/office/drawing/2014/main" id="{8F33BDD2-6E03-4E0C-932A-8C84900A3E1B}"/>
-              </a:ext>
-            </a:extLst>
-          </p:cNvPr>
-          <p:cNvSpPr txBox="1"/>
-          <p:nvPr/>
-        </p:nvSpPr>
-        <p:spPr>
-          <a:xfrm>
-            <a:off x="8323008" y="254692"/>
-            <a:ext cx="2099187" cy="923330"/>
-          </a:xfrm>
-          <a:prstGeom prst="rect">
-            <a:avLst/>
-          </a:prstGeom>
-          <a:noFill/>
-        </p:spPr>
-        <p:txBody>
-          <a:bodyPr wrap="square" rtlCol="0">
-            <a:spAutoFit/>
-          </a:bodyPr>
-          <a:lstStyle/>
-          <a:p>
-            <a:r>
-              <a:rPr lang="en-US" b="1" dirty="0">
-                <a:solidFill>
-                  <a:srgbClr val="FF0000"/>
-                </a:solidFill>
-              </a:rPr>
-              <a:t>“Heuristic” is the genes identified by GeneMark Heuristic</a:t>
-            </a:r>
-          </a:p>
-        </p:txBody>
-      </p:sp>
-      <p:cxnSp>
-        <p:nvCxnSpPr>
-          <p:cNvPr id="18" name="Straight Arrow Connector 17">
-            <a:extLst>
-              <a:ext uri="{FF2B5EF4-FFF2-40B4-BE49-F238E27FC236}">
-                <a16:creationId xmlns:a16="http://schemas.microsoft.com/office/drawing/2014/main" id="{9B73B8D2-DBAD-48B9-B3F0-B89CAEADB73D}"/>
-              </a:ext>
-            </a:extLst>
-          </p:cNvPr>
-          <p:cNvCxnSpPr>
-            <a:cxnSpLocks/>
-          </p:cNvCxnSpPr>
-          <p:nvPr/>
-        </p:nvCxnSpPr>
-        <p:spPr>
-          <a:xfrm>
-            <a:off x="8749516" y="1134743"/>
-            <a:ext cx="0" cy="924966"/>
-          </a:xfrm>
-          <a:prstGeom prst="straightConnector1">
-            <a:avLst/>
-          </a:prstGeom>
-          <a:ln w="57150">
-            <a:solidFill>
-              <a:srgbClr val="FF0000"/>
-            </a:solidFill>
-            <a:tailEnd type="triangle"/>
-          </a:ln>
-        </p:spPr>
-        <p:style>
-          <a:lnRef idx="1">
-            <a:schemeClr val="accent1"/>
-          </a:lnRef>
-          <a:fillRef idx="0">
-            <a:schemeClr val="accent1"/>
-          </a:fillRef>
-          <a:effectRef idx="0">
-            <a:schemeClr val="accent1"/>
-          </a:effectRef>
-          <a:fontRef idx="minor">
-            <a:schemeClr val="tx1"/>
-          </a:fontRef>
-        </p:style>
-      </p:cxnSp>
-      <p:sp>
-        <p:nvSpPr>
-          <p:cNvPr id="19" name="TextBox 18">
-            <a:extLst>
-              <a:ext uri="{FF2B5EF4-FFF2-40B4-BE49-F238E27FC236}">
-                <a16:creationId xmlns:a16="http://schemas.microsoft.com/office/drawing/2014/main" id="{CE8D919F-823D-4B09-BAD2-E988E85E6C57}"/>
-              </a:ext>
-            </a:extLst>
-          </p:cNvPr>
-          <p:cNvSpPr txBox="1"/>
-          <p:nvPr/>
-        </p:nvSpPr>
-        <p:spPr>
-          <a:xfrm>
-            <a:off x="132594" y="2211018"/>
-            <a:ext cx="1946786" cy="369332"/>
-          </a:xfrm>
-          <a:prstGeom prst="rect">
-            <a:avLst/>
-          </a:prstGeom>
-          <a:noFill/>
-        </p:spPr>
-        <p:txBody>
-          <a:bodyPr wrap="square" rtlCol="0">
-            <a:spAutoFit/>
-          </a:bodyPr>
-          <a:lstStyle/>
-          <a:p>
-            <a:r>
-              <a:rPr lang="en-US" b="1" dirty="0">
-                <a:solidFill>
-                  <a:srgbClr val="FF0000"/>
-                </a:solidFill>
-              </a:rPr>
-              <a:t>Each row is a gene</a:t>
-            </a:r>
-          </a:p>
-        </p:txBody>
-      </p:sp>
-      <p:sp>
-        <p:nvSpPr>
-          <p:cNvPr id="34" name="TextBox 33">
-            <a:extLst>
-              <a:ext uri="{FF2B5EF4-FFF2-40B4-BE49-F238E27FC236}">
-                <a16:creationId xmlns:a16="http://schemas.microsoft.com/office/drawing/2014/main" id="{EC388BF4-AF1D-4DB0-A147-172109F41ED4}"/>
-              </a:ext>
-            </a:extLst>
-          </p:cNvPr>
-          <p:cNvSpPr txBox="1"/>
-          <p:nvPr/>
-        </p:nvSpPr>
-        <p:spPr>
-          <a:xfrm>
-            <a:off x="10112619" y="2228671"/>
-            <a:ext cx="2079381" cy="2308324"/>
-          </a:xfrm>
-          <a:prstGeom prst="rect">
-            <a:avLst/>
-          </a:prstGeom>
-          <a:noFill/>
-        </p:spPr>
-        <p:txBody>
-          <a:bodyPr wrap="square" rtlCol="0">
-            <a:spAutoFit/>
-          </a:bodyPr>
-          <a:lstStyle/>
-          <a:p>
-            <a:r>
-              <a:rPr lang="en-US" b="1" dirty="0">
-                <a:solidFill>
-                  <a:srgbClr val="FF0000"/>
-                </a:solidFill>
-              </a:rPr>
-              <a:t>Row shading is proportional to how many programs identify a gene (darker = more programs, white =  only one program)</a:t>
-            </a:r>
-          </a:p>
-        </p:txBody>
-      </p:sp>
     </p:spTree>
     <p:extLst>
       <p:ext uri="{BB962C8B-B14F-4D97-AF65-F5344CB8AC3E}">
@@ -5508,10 +5669,10 @@
       </p:grpSpPr>
       <p:pic>
         <p:nvPicPr>
-          <p:cNvPr id="5" name="Picture 4">
+          <p:cNvPr id="30" name="Picture 29">
             <a:extLst>
               <a:ext uri="{FF2B5EF4-FFF2-40B4-BE49-F238E27FC236}">
-                <a16:creationId xmlns:a16="http://schemas.microsoft.com/office/drawing/2014/main" id="{D4F80F4B-D3E1-4981-9947-E86826E3903B}"/>
+                <a16:creationId xmlns:a16="http://schemas.microsoft.com/office/drawing/2014/main" id="{AE97BD04-6CCE-4C1D-B086-18CD00C74C4A}"/>
               </a:ext>
             </a:extLst>
           </p:cNvPr>
@@ -5522,181 +5683,25 @@
         </p:nvPicPr>
         <p:blipFill rotWithShape="1">
           <a:blip r:embed="rId2"/>
-          <a:srcRect t="1" b="17391"/>
+          <a:srcRect r="49840" b="35486"/>
           <a:stretch/>
         </p:blipFill>
         <p:spPr>
           <a:xfrm>
-            <a:off x="1720262" y="1666535"/>
-            <a:ext cx="8701933" cy="3893756"/>
+            <a:off x="518835" y="511012"/>
+            <a:ext cx="9978450" cy="5371954"/>
           </a:xfrm>
           <a:prstGeom prst="rect">
             <a:avLst/>
           </a:prstGeom>
         </p:spPr>
       </p:pic>
-      <p:sp>
-        <p:nvSpPr>
-          <p:cNvPr id="6" name="TextBox 5">
+      <p:cxnSp>
+        <p:nvCxnSpPr>
+          <p:cNvPr id="33" name="Straight Arrow Connector 32">
             <a:extLst>
               <a:ext uri="{FF2B5EF4-FFF2-40B4-BE49-F238E27FC236}">
-                <a16:creationId xmlns:a16="http://schemas.microsoft.com/office/drawing/2014/main" id="{97723825-3C77-4E0D-9FE8-1DB1D5F0D5E1}"/>
-              </a:ext>
-            </a:extLst>
-          </p:cNvPr>
-          <p:cNvSpPr txBox="1"/>
-          <p:nvPr/>
-        </p:nvSpPr>
-        <p:spPr>
-          <a:xfrm>
-            <a:off x="1769064" y="254692"/>
-            <a:ext cx="2193337" cy="923330"/>
-          </a:xfrm>
-          <a:prstGeom prst="rect">
-            <a:avLst/>
-          </a:prstGeom>
-          <a:noFill/>
-        </p:spPr>
-        <p:txBody>
-          <a:bodyPr wrap="square" rtlCol="0">
-            <a:spAutoFit/>
-          </a:bodyPr>
-          <a:lstStyle/>
-          <a:p>
-            <a:r>
-              <a:rPr lang="en-US" b="1" dirty="0">
-                <a:solidFill>
-                  <a:srgbClr val="FF0000"/>
-                </a:solidFill>
-              </a:rPr>
-              <a:t>“GM” is the genes identified by GeneMark S</a:t>
-            </a:r>
-          </a:p>
-        </p:txBody>
-      </p:sp>
-      <p:sp>
-        <p:nvSpPr>
-          <p:cNvPr id="7" name="TextBox 6">
-            <a:extLst>
-              <a:ext uri="{FF2B5EF4-FFF2-40B4-BE49-F238E27FC236}">
-                <a16:creationId xmlns:a16="http://schemas.microsoft.com/office/drawing/2014/main" id="{90965C62-4B59-4DFA-B964-9A0793A2C133}"/>
-              </a:ext>
-            </a:extLst>
-          </p:cNvPr>
-          <p:cNvSpPr txBox="1"/>
-          <p:nvPr/>
-        </p:nvSpPr>
-        <p:spPr>
-          <a:xfrm>
-            <a:off x="3962400" y="254692"/>
-            <a:ext cx="1946786" cy="923330"/>
-          </a:xfrm>
-          <a:prstGeom prst="rect">
-            <a:avLst/>
-          </a:prstGeom>
-          <a:noFill/>
-        </p:spPr>
-        <p:txBody>
-          <a:bodyPr wrap="square" rtlCol="0">
-            <a:spAutoFit/>
-          </a:bodyPr>
-          <a:lstStyle/>
-          <a:p>
-            <a:r>
-              <a:rPr lang="en-US" b="1" dirty="0">
-                <a:solidFill>
-                  <a:srgbClr val="FF0000"/>
-                </a:solidFill>
-              </a:rPr>
-              <a:t>“Glimmer” is the genes identified by Glimmer</a:t>
-            </a:r>
-          </a:p>
-        </p:txBody>
-      </p:sp>
-      <p:sp>
-        <p:nvSpPr>
-          <p:cNvPr id="8" name="TextBox 7">
-            <a:extLst>
-              <a:ext uri="{FF2B5EF4-FFF2-40B4-BE49-F238E27FC236}">
-                <a16:creationId xmlns:a16="http://schemas.microsoft.com/office/drawing/2014/main" id="{B7D00B51-F022-49DC-A713-D119F08E7340}"/>
-              </a:ext>
-            </a:extLst>
-          </p:cNvPr>
-          <p:cNvSpPr txBox="1"/>
-          <p:nvPr/>
-        </p:nvSpPr>
-        <p:spPr>
-          <a:xfrm>
-            <a:off x="6100918" y="254692"/>
-            <a:ext cx="2030361" cy="923330"/>
-          </a:xfrm>
-          <a:prstGeom prst="rect">
-            <a:avLst/>
-          </a:prstGeom>
-          <a:noFill/>
-        </p:spPr>
-        <p:txBody>
-          <a:bodyPr wrap="square" rtlCol="0">
-            <a:spAutoFit/>
-          </a:bodyPr>
-          <a:lstStyle/>
-          <a:p>
-            <a:r>
-              <a:rPr lang="en-US" b="1" dirty="0">
-                <a:solidFill>
-                  <a:srgbClr val="FF0000"/>
-                </a:solidFill>
-              </a:rPr>
-              <a:t>“Prodigal” is the genes identified by Prodigal</a:t>
-            </a:r>
-          </a:p>
-        </p:txBody>
-      </p:sp>
-      <p:sp>
-        <p:nvSpPr>
-          <p:cNvPr id="9" name="TextBox 8">
-            <a:extLst>
-              <a:ext uri="{FF2B5EF4-FFF2-40B4-BE49-F238E27FC236}">
-                <a16:creationId xmlns:a16="http://schemas.microsoft.com/office/drawing/2014/main" id="{9DD42FB1-A180-4576-9650-AD1025C39860}"/>
-              </a:ext>
-            </a:extLst>
-          </p:cNvPr>
-          <p:cNvSpPr txBox="1"/>
-          <p:nvPr/>
-        </p:nvSpPr>
-        <p:spPr>
-          <a:xfrm>
-            <a:off x="8323008" y="254692"/>
-            <a:ext cx="2099187" cy="923330"/>
-          </a:xfrm>
-          <a:prstGeom prst="rect">
-            <a:avLst/>
-          </a:prstGeom>
-          <a:noFill/>
-        </p:spPr>
-        <p:txBody>
-          <a:bodyPr wrap="square" rtlCol="0">
-            <a:spAutoFit/>
-          </a:bodyPr>
-          <a:lstStyle/>
-          <a:p>
-            <a:r>
-              <a:rPr lang="en-US" b="1" dirty="0">
-                <a:solidFill>
-                  <a:srgbClr val="FF0000"/>
-                </a:solidFill>
-              </a:rPr>
-              <a:t>“Metagene” is the genes identified by Metagene</a:t>
-            </a:r>
-          </a:p>
-        </p:txBody>
-      </p:sp>
-      <p:cxnSp>
-        <p:nvCxnSpPr>
-          <p:cNvPr id="10" name="Straight Arrow Connector 9">
-            <a:extLst>
-              <a:ext uri="{FF2B5EF4-FFF2-40B4-BE49-F238E27FC236}">
-                <a16:creationId xmlns:a16="http://schemas.microsoft.com/office/drawing/2014/main" id="{6694B554-0CD0-4F11-80D1-F91CDD49AF9B}"/>
+                <a16:creationId xmlns:a16="http://schemas.microsoft.com/office/drawing/2014/main" id="{19767628-97CA-47FF-A3AE-F4B388D0E71D}"/>
               </a:ext>
             </a:extLst>
           </p:cNvPr>
@@ -5706,9 +5711,9 @@
           <p:nvPr/>
         </p:nvCxnSpPr>
         <p:spPr>
-          <a:xfrm>
-            <a:off x="8878825" y="1178023"/>
-            <a:ext cx="0" cy="724669"/>
+          <a:xfrm flipV="1">
+            <a:off x="5029438" y="5882966"/>
+            <a:ext cx="0" cy="461801"/>
           </a:xfrm>
           <a:prstGeom prst="straightConnector1">
             <a:avLst/>
@@ -5735,12 +5740,51 @@
           </a:fontRef>
         </p:style>
       </p:cxnSp>
+      <p:sp>
+        <p:nvSpPr>
+          <p:cNvPr id="34" name="TextBox 33">
+            <a:extLst>
+              <a:ext uri="{FF2B5EF4-FFF2-40B4-BE49-F238E27FC236}">
+                <a16:creationId xmlns:a16="http://schemas.microsoft.com/office/drawing/2014/main" id="{7D73A8F5-5AB5-4ED4-A05F-0C54FDD0815C}"/>
+              </a:ext>
+            </a:extLst>
+          </p:cNvPr>
+          <p:cNvSpPr txBox="1"/>
+          <p:nvPr/>
+        </p:nvSpPr>
+        <p:spPr>
+          <a:xfrm>
+            <a:off x="4759504" y="6300105"/>
+            <a:ext cx="1835087" cy="646331"/>
+          </a:xfrm>
+          <a:prstGeom prst="rect">
+            <a:avLst/>
+          </a:prstGeom>
+          <a:noFill/>
+        </p:spPr>
+        <p:txBody>
+          <a:bodyPr wrap="square" rtlCol="0">
+            <a:spAutoFit/>
+          </a:bodyPr>
+          <a:lstStyle/>
+          <a:p>
+            <a:r>
+              <a:rPr lang="en-US" b="1" dirty="0">
+                <a:solidFill>
+                  <a:srgbClr val="FF0000"/>
+                </a:solidFill>
+              </a:rPr>
+              <a:t>Gene stop (start if strand is “-”)</a:t>
+            </a:r>
+          </a:p>
+        </p:txBody>
+      </p:sp>
       <p:cxnSp>
         <p:nvCxnSpPr>
-          <p:cNvPr id="14" name="Straight Arrow Connector 13">
+          <p:cNvPr id="35" name="Straight Arrow Connector 34">
             <a:extLst>
               <a:ext uri="{FF2B5EF4-FFF2-40B4-BE49-F238E27FC236}">
-                <a16:creationId xmlns:a16="http://schemas.microsoft.com/office/drawing/2014/main" id="{25FB1019-75D3-4F1F-A630-9F34C8EC2D68}"/>
+                <a16:creationId xmlns:a16="http://schemas.microsoft.com/office/drawing/2014/main" id="{2B8AD9CE-C4F0-4A13-AB91-9F16359ADAD3}"/>
               </a:ext>
             </a:extLst>
           </p:cNvPr>
@@ -5750,9 +5794,9 @@
           <p:nvPr/>
         </p:nvCxnSpPr>
         <p:spPr>
-          <a:xfrm>
-            <a:off x="2501115" y="1178023"/>
-            <a:ext cx="0" cy="724669"/>
+          <a:xfrm flipV="1">
+            <a:off x="4242610" y="5860956"/>
+            <a:ext cx="256128" cy="461160"/>
           </a:xfrm>
           <a:prstGeom prst="straightConnector1">
             <a:avLst/>
@@ -5779,24 +5823,64 @@
           </a:fontRef>
         </p:style>
       </p:cxnSp>
+      <p:sp>
+        <p:nvSpPr>
+          <p:cNvPr id="38" name="TextBox 37">
+            <a:extLst>
+              <a:ext uri="{FF2B5EF4-FFF2-40B4-BE49-F238E27FC236}">
+                <a16:creationId xmlns:a16="http://schemas.microsoft.com/office/drawing/2014/main" id="{86A56621-006A-4510-8BDB-352DD86446AC}"/>
+              </a:ext>
+            </a:extLst>
+          </p:cNvPr>
+          <p:cNvSpPr txBox="1"/>
+          <p:nvPr/>
+        </p:nvSpPr>
+        <p:spPr>
+          <a:xfrm>
+            <a:off x="3004744" y="6231033"/>
+            <a:ext cx="1731005" cy="646331"/>
+          </a:xfrm>
+          <a:prstGeom prst="rect">
+            <a:avLst/>
+          </a:prstGeom>
+          <a:noFill/>
+        </p:spPr>
+        <p:txBody>
+          <a:bodyPr wrap="square" rtlCol="0">
+            <a:spAutoFit/>
+          </a:bodyPr>
+          <a:lstStyle/>
+          <a:p>
+            <a:r>
+              <a:rPr lang="en-US" b="1" dirty="0">
+                <a:solidFill>
+                  <a:srgbClr val="FF0000"/>
+                </a:solidFill>
+              </a:rPr>
+              <a:t>Gene start (stop if strand “-”)</a:t>
+            </a:r>
+          </a:p>
+        </p:txBody>
+      </p:sp>
       <p:cxnSp>
         <p:nvCxnSpPr>
-          <p:cNvPr id="15" name="Straight Arrow Connector 14">
+          <p:cNvPr id="39" name="Straight Arrow Connector 38">
             <a:extLst>
               <a:ext uri="{FF2B5EF4-FFF2-40B4-BE49-F238E27FC236}">
-                <a16:creationId xmlns:a16="http://schemas.microsoft.com/office/drawing/2014/main" id="{7F682CC7-186E-4B03-8348-90AE4712C5AF}"/>
+                <a16:creationId xmlns:a16="http://schemas.microsoft.com/office/drawing/2014/main" id="{ADB3099B-0D90-4E08-8A02-4D7D0455E2AC}"/>
               </a:ext>
             </a:extLst>
           </p:cNvPr>
           <p:cNvCxnSpPr>
             <a:cxnSpLocks/>
+            <a:endCxn id="30" idx="2"/>
           </p:cNvCxnSpPr>
           <p:nvPr/>
         </p:nvCxnSpPr>
         <p:spPr>
-          <a:xfrm>
-            <a:off x="4325299" y="1178023"/>
-            <a:ext cx="0" cy="724669"/>
+          <a:xfrm flipH="1" flipV="1">
+            <a:off x="5508060" y="5882966"/>
+            <a:ext cx="1444998" cy="559830"/>
           </a:xfrm>
           <a:prstGeom prst="straightConnector1">
             <a:avLst/>
@@ -5823,12 +5907,51 @@
           </a:fontRef>
         </p:style>
       </p:cxnSp>
+      <p:sp>
+        <p:nvSpPr>
+          <p:cNvPr id="40" name="TextBox 39">
+            <a:extLst>
+              <a:ext uri="{FF2B5EF4-FFF2-40B4-BE49-F238E27FC236}">
+                <a16:creationId xmlns:a16="http://schemas.microsoft.com/office/drawing/2014/main" id="{EDECE8F2-2665-4AEA-83B3-4B9B3DAF9CD9}"/>
+              </a:ext>
+            </a:extLst>
+          </p:cNvPr>
+          <p:cNvSpPr txBox="1"/>
+          <p:nvPr/>
+        </p:nvSpPr>
+        <p:spPr>
+          <a:xfrm>
+            <a:off x="6846385" y="6277502"/>
+            <a:ext cx="2239669" cy="369332"/>
+          </a:xfrm>
+          <a:prstGeom prst="rect">
+            <a:avLst/>
+          </a:prstGeom>
+          <a:noFill/>
+        </p:spPr>
+        <p:txBody>
+          <a:bodyPr wrap="square" rtlCol="0">
+            <a:spAutoFit/>
+          </a:bodyPr>
+          <a:lstStyle/>
+          <a:p>
+            <a:r>
+              <a:rPr lang="en-US" b="1" dirty="0">
+                <a:solidFill>
+                  <a:srgbClr val="FF0000"/>
+                </a:solidFill>
+              </a:rPr>
+              <a:t>   Gene length</a:t>
+            </a:r>
+          </a:p>
+        </p:txBody>
+      </p:sp>
       <p:cxnSp>
         <p:nvCxnSpPr>
-          <p:cNvPr id="16" name="Straight Arrow Connector 15">
+          <p:cNvPr id="41" name="Straight Arrow Connector 40">
             <a:extLst>
               <a:ext uri="{FF2B5EF4-FFF2-40B4-BE49-F238E27FC236}">
-                <a16:creationId xmlns:a16="http://schemas.microsoft.com/office/drawing/2014/main" id="{A5D079D1-8D11-431A-8499-493B53E64DD4}"/>
+                <a16:creationId xmlns:a16="http://schemas.microsoft.com/office/drawing/2014/main" id="{4ABBEC17-556A-4A34-9F23-3C41A1E451F2}"/>
               </a:ext>
             </a:extLst>
           </p:cNvPr>
@@ -5838,9 +5961,9 @@
           <p:nvPr/>
         </p:nvCxnSpPr>
         <p:spPr>
-          <a:xfrm>
-            <a:off x="6611298" y="1178023"/>
-            <a:ext cx="0" cy="724669"/>
+          <a:xfrm flipV="1">
+            <a:off x="2650963" y="5860956"/>
+            <a:ext cx="1393900" cy="599269"/>
           </a:xfrm>
           <a:prstGeom prst="straightConnector1">
             <a:avLst/>
@@ -5867,56 +5990,12 @@
           </a:fontRef>
         </p:style>
       </p:cxnSp>
-      <p:cxnSp>
-        <p:nvCxnSpPr>
-          <p:cNvPr id="20" name="Straight Arrow Connector 19">
+      <p:sp>
+        <p:nvSpPr>
+          <p:cNvPr id="42" name="TextBox 41">
             <a:extLst>
               <a:ext uri="{FF2B5EF4-FFF2-40B4-BE49-F238E27FC236}">
-                <a16:creationId xmlns:a16="http://schemas.microsoft.com/office/drawing/2014/main" id="{C31E88C2-96F8-4793-8A01-58EE9621E6A7}"/>
-              </a:ext>
-            </a:extLst>
-          </p:cNvPr>
-          <p:cNvCxnSpPr>
-            <a:cxnSpLocks/>
-          </p:cNvCxnSpPr>
-          <p:nvPr/>
-        </p:nvCxnSpPr>
-        <p:spPr>
-          <a:xfrm flipV="1">
-            <a:off x="5246255" y="5536741"/>
-            <a:ext cx="0" cy="546920"/>
-          </a:xfrm>
-          <a:prstGeom prst="straightConnector1">
-            <a:avLst/>
-          </a:prstGeom>
-          <a:ln w="57150">
-            <a:solidFill>
-              <a:srgbClr val="FF0000"/>
-            </a:solidFill>
-            <a:tailEnd type="triangle"/>
-          </a:ln>
-        </p:spPr>
-        <p:style>
-          <a:lnRef idx="1">
-            <a:schemeClr val="accent1"/>
-          </a:lnRef>
-          <a:fillRef idx="0">
-            <a:schemeClr val="accent1"/>
-          </a:fillRef>
-          <a:effectRef idx="0">
-            <a:schemeClr val="accent1"/>
-          </a:effectRef>
-          <a:fontRef idx="minor">
-            <a:schemeClr val="tx1"/>
-          </a:fontRef>
-        </p:style>
-      </p:cxnSp>
-      <p:sp>
-        <p:nvSpPr>
-          <p:cNvPr id="21" name="TextBox 20">
-            <a:extLst>
-              <a:ext uri="{FF2B5EF4-FFF2-40B4-BE49-F238E27FC236}">
-                <a16:creationId xmlns:a16="http://schemas.microsoft.com/office/drawing/2014/main" id="{16E17C37-3D08-413F-8036-E49C69A34EF4}"/>
+                <a16:creationId xmlns:a16="http://schemas.microsoft.com/office/drawing/2014/main" id="{FBC8FB49-2701-4BB5-8EB7-91C8B569AD09}"/>
               </a:ext>
             </a:extLst>
           </p:cNvPr>
@@ -5925,256 +6004,7 @@
         </p:nvSpPr>
         <p:spPr>
           <a:xfrm>
-            <a:off x="4768931" y="6073857"/>
-            <a:ext cx="1835087" cy="646331"/>
-          </a:xfrm>
-          <a:prstGeom prst="rect">
-            <a:avLst/>
-          </a:prstGeom>
-          <a:noFill/>
-        </p:spPr>
-        <p:txBody>
-          <a:bodyPr wrap="square" rtlCol="0">
-            <a:spAutoFit/>
-          </a:bodyPr>
-          <a:lstStyle/>
-          <a:p>
-            <a:r>
-              <a:rPr lang="en-US" b="1" dirty="0">
-                <a:solidFill>
-                  <a:srgbClr val="FF0000"/>
-                </a:solidFill>
-              </a:rPr>
-              <a:t>Gene stop (start if strand is “-”)</a:t>
-            </a:r>
-          </a:p>
-        </p:txBody>
-      </p:sp>
-      <p:cxnSp>
-        <p:nvCxnSpPr>
-          <p:cNvPr id="22" name="Straight Arrow Connector 21">
-            <a:extLst>
-              <a:ext uri="{FF2B5EF4-FFF2-40B4-BE49-F238E27FC236}">
-                <a16:creationId xmlns:a16="http://schemas.microsoft.com/office/drawing/2014/main" id="{E85FD6CA-ACFC-42DC-B66E-8D78B8CE4B4F}"/>
-              </a:ext>
-            </a:extLst>
-          </p:cNvPr>
-          <p:cNvCxnSpPr>
-            <a:cxnSpLocks/>
-          </p:cNvCxnSpPr>
-          <p:nvPr/>
-        </p:nvCxnSpPr>
-        <p:spPr>
-          <a:xfrm flipV="1">
-            <a:off x="4325299" y="5571600"/>
-            <a:ext cx="411212" cy="477205"/>
-          </a:xfrm>
-          <a:prstGeom prst="straightConnector1">
-            <a:avLst/>
-          </a:prstGeom>
-          <a:ln w="57150">
-            <a:solidFill>
-              <a:srgbClr val="FF0000"/>
-            </a:solidFill>
-            <a:tailEnd type="triangle"/>
-          </a:ln>
-        </p:spPr>
-        <p:style>
-          <a:lnRef idx="1">
-            <a:schemeClr val="accent1"/>
-          </a:lnRef>
-          <a:fillRef idx="0">
-            <a:schemeClr val="accent1"/>
-          </a:fillRef>
-          <a:effectRef idx="0">
-            <a:schemeClr val="accent1"/>
-          </a:effectRef>
-          <a:fontRef idx="minor">
-            <a:schemeClr val="tx1"/>
-          </a:fontRef>
-        </p:style>
-      </p:cxnSp>
-      <p:sp>
-        <p:nvSpPr>
-          <p:cNvPr id="23" name="TextBox 22">
-            <a:extLst>
-              <a:ext uri="{FF2B5EF4-FFF2-40B4-BE49-F238E27FC236}">
-                <a16:creationId xmlns:a16="http://schemas.microsoft.com/office/drawing/2014/main" id="{403479BF-9BCD-401A-968B-D76CCB2593EF}"/>
-              </a:ext>
-            </a:extLst>
-          </p:cNvPr>
-          <p:cNvSpPr txBox="1"/>
-          <p:nvPr/>
-        </p:nvSpPr>
-        <p:spPr>
-          <a:xfrm>
-            <a:off x="3014171" y="6004785"/>
-            <a:ext cx="1731005" cy="646331"/>
-          </a:xfrm>
-          <a:prstGeom prst="rect">
-            <a:avLst/>
-          </a:prstGeom>
-          <a:noFill/>
-        </p:spPr>
-        <p:txBody>
-          <a:bodyPr wrap="square" rtlCol="0">
-            <a:spAutoFit/>
-          </a:bodyPr>
-          <a:lstStyle/>
-          <a:p>
-            <a:r>
-              <a:rPr lang="en-US" b="1" dirty="0">
-                <a:solidFill>
-                  <a:srgbClr val="FF0000"/>
-                </a:solidFill>
-              </a:rPr>
-              <a:t>Gene start (stop if strand “-”)</a:t>
-            </a:r>
-          </a:p>
-        </p:txBody>
-      </p:sp>
-      <p:cxnSp>
-        <p:nvCxnSpPr>
-          <p:cNvPr id="24" name="Straight Arrow Connector 23">
-            <a:extLst>
-              <a:ext uri="{FF2B5EF4-FFF2-40B4-BE49-F238E27FC236}">
-                <a16:creationId xmlns:a16="http://schemas.microsoft.com/office/drawing/2014/main" id="{AD131B5D-A37D-4758-B905-D8113A4A8630}"/>
-              </a:ext>
-            </a:extLst>
-          </p:cNvPr>
-          <p:cNvCxnSpPr>
-            <a:cxnSpLocks/>
-          </p:cNvCxnSpPr>
-          <p:nvPr/>
-        </p:nvCxnSpPr>
-        <p:spPr>
-          <a:xfrm flipH="1" flipV="1">
-            <a:off x="5782093" y="5571599"/>
-            <a:ext cx="1444997" cy="662378"/>
-          </a:xfrm>
-          <a:prstGeom prst="straightConnector1">
-            <a:avLst/>
-          </a:prstGeom>
-          <a:ln w="57150">
-            <a:solidFill>
-              <a:srgbClr val="FF0000"/>
-            </a:solidFill>
-            <a:tailEnd type="triangle"/>
-          </a:ln>
-        </p:spPr>
-        <p:style>
-          <a:lnRef idx="1">
-            <a:schemeClr val="accent1"/>
-          </a:lnRef>
-          <a:fillRef idx="0">
-            <a:schemeClr val="accent1"/>
-          </a:fillRef>
-          <a:effectRef idx="0">
-            <a:schemeClr val="accent1"/>
-          </a:effectRef>
-          <a:fontRef idx="minor">
-            <a:schemeClr val="tx1"/>
-          </a:fontRef>
-        </p:style>
-      </p:cxnSp>
-      <p:sp>
-        <p:nvSpPr>
-          <p:cNvPr id="25" name="TextBox 24">
-            <a:extLst>
-              <a:ext uri="{FF2B5EF4-FFF2-40B4-BE49-F238E27FC236}">
-                <a16:creationId xmlns:a16="http://schemas.microsoft.com/office/drawing/2014/main" id="{3E3A2B5F-D1C6-4DF8-8D80-4E158646C8CD}"/>
-              </a:ext>
-            </a:extLst>
-          </p:cNvPr>
-          <p:cNvSpPr txBox="1"/>
-          <p:nvPr/>
-        </p:nvSpPr>
-        <p:spPr>
-          <a:xfrm>
-            <a:off x="7116098" y="6143283"/>
-            <a:ext cx="2239669" cy="369332"/>
-          </a:xfrm>
-          <a:prstGeom prst="rect">
-            <a:avLst/>
-          </a:prstGeom>
-          <a:noFill/>
-        </p:spPr>
-        <p:txBody>
-          <a:bodyPr wrap="square" rtlCol="0">
-            <a:spAutoFit/>
-          </a:bodyPr>
-          <a:lstStyle/>
-          <a:p>
-            <a:r>
-              <a:rPr lang="en-US" b="1" dirty="0">
-                <a:solidFill>
-                  <a:srgbClr val="FF0000"/>
-                </a:solidFill>
-              </a:rPr>
-              <a:t>   Gene length</a:t>
-            </a:r>
-          </a:p>
-        </p:txBody>
-      </p:sp>
-      <p:cxnSp>
-        <p:nvCxnSpPr>
-          <p:cNvPr id="36" name="Straight Arrow Connector 35">
-            <a:extLst>
-              <a:ext uri="{FF2B5EF4-FFF2-40B4-BE49-F238E27FC236}">
-                <a16:creationId xmlns:a16="http://schemas.microsoft.com/office/drawing/2014/main" id="{701FF750-1C6C-40B9-A94D-2E9A649CCF35}"/>
-              </a:ext>
-            </a:extLst>
-          </p:cNvPr>
-          <p:cNvCxnSpPr>
-            <a:cxnSpLocks/>
-          </p:cNvCxnSpPr>
-          <p:nvPr/>
-        </p:nvCxnSpPr>
-        <p:spPr>
-          <a:xfrm flipV="1">
-            <a:off x="2660390" y="5536741"/>
-            <a:ext cx="1485468" cy="697236"/>
-          </a:xfrm>
-          <a:prstGeom prst="straightConnector1">
-            <a:avLst/>
-          </a:prstGeom>
-          <a:ln w="57150">
-            <a:solidFill>
-              <a:srgbClr val="FF0000"/>
-            </a:solidFill>
-            <a:tailEnd type="triangle"/>
-          </a:ln>
-        </p:spPr>
-        <p:style>
-          <a:lnRef idx="1">
-            <a:schemeClr val="accent1"/>
-          </a:lnRef>
-          <a:fillRef idx="0">
-            <a:schemeClr val="accent1"/>
-          </a:fillRef>
-          <a:effectRef idx="0">
-            <a:schemeClr val="accent1"/>
-          </a:effectRef>
-          <a:fontRef idx="minor">
-            <a:schemeClr val="tx1"/>
-          </a:fontRef>
-        </p:style>
-      </p:cxnSp>
-      <p:sp>
-        <p:nvSpPr>
-          <p:cNvPr id="37" name="TextBox 36">
-            <a:extLst>
-              <a:ext uri="{FF2B5EF4-FFF2-40B4-BE49-F238E27FC236}">
-                <a16:creationId xmlns:a16="http://schemas.microsoft.com/office/drawing/2014/main" id="{2D9AB5D8-F921-4C06-BFC3-7BE9971D8E02}"/>
-              </a:ext>
-            </a:extLst>
-          </p:cNvPr>
-          <p:cNvSpPr txBox="1"/>
-          <p:nvPr/>
-        </p:nvSpPr>
-        <p:spPr>
-          <a:xfrm>
-            <a:off x="1794502" y="5774255"/>
+            <a:off x="1785075" y="6000503"/>
             <a:ext cx="1300030" cy="646331"/>
           </a:xfrm>
           <a:prstGeom prst="rect">
@@ -6195,6 +6025,45 @@
                 </a:solidFill>
               </a:rPr>
               <a:t>DNA strand (+ or -)</a:t>
+            </a:r>
+          </a:p>
+        </p:txBody>
+      </p:sp>
+      <p:sp>
+        <p:nvSpPr>
+          <p:cNvPr id="43" name="TextBox 42">
+            <a:extLst>
+              <a:ext uri="{FF2B5EF4-FFF2-40B4-BE49-F238E27FC236}">
+                <a16:creationId xmlns:a16="http://schemas.microsoft.com/office/drawing/2014/main" id="{D11026A6-503C-4C95-A8D6-5D3BAED0A40F}"/>
+              </a:ext>
+            </a:extLst>
+          </p:cNvPr>
+          <p:cNvSpPr txBox="1"/>
+          <p:nvPr/>
+        </p:nvSpPr>
+        <p:spPr>
+          <a:xfrm>
+            <a:off x="10600980" y="1606502"/>
+            <a:ext cx="1591020" cy="2585323"/>
+          </a:xfrm>
+          <a:prstGeom prst="rect">
+            <a:avLst/>
+          </a:prstGeom>
+          <a:noFill/>
+        </p:spPr>
+        <p:txBody>
+          <a:bodyPr wrap="square" rtlCol="0">
+            <a:spAutoFit/>
+          </a:bodyPr>
+          <a:lstStyle/>
+          <a:p>
+            <a:r>
+              <a:rPr lang="en-US" b="1" dirty="0">
+                <a:solidFill>
+                  <a:srgbClr val="FF0000"/>
+                </a:solidFill>
+              </a:rPr>
+              <a:t>Row shading is proportional to how many programs identify a gene (darker = more programs, white =  only one program)</a:t>
             </a:r>
           </a:p>
         </p:txBody>
@@ -6213,6 +6082,229 @@
 </file>
 
 <file path=ppt/slides/slide8.xml><?xml version="1.0" encoding="utf-8"?>
+<p:sld xmlns:a="http://schemas.openxmlformats.org/drawingml/2006/main" xmlns:r="http://schemas.openxmlformats.org/officeDocument/2006/relationships" xmlns:p="http://schemas.openxmlformats.org/presentationml/2006/main">
+  <p:cSld>
+    <p:spTree>
+      <p:nvGrpSpPr>
+        <p:cNvPr id="1" name=""/>
+        <p:cNvGrpSpPr/>
+        <p:nvPr/>
+      </p:nvGrpSpPr>
+      <p:grpSpPr>
+        <a:xfrm>
+          <a:off x="0" y="0"/>
+          <a:ext cx="0" cy="0"/>
+          <a:chOff x="0" y="0"/>
+          <a:chExt cx="0" cy="0"/>
+        </a:xfrm>
+      </p:grpSpPr>
+      <p:sp>
+        <p:nvSpPr>
+          <p:cNvPr id="3" name="TextBox 2">
+            <a:extLst>
+              <a:ext uri="{FF2B5EF4-FFF2-40B4-BE49-F238E27FC236}">
+                <a16:creationId xmlns:a16="http://schemas.microsoft.com/office/drawing/2014/main" id="{985E05DE-C2CE-44C9-B34F-608282C0E6E0}"/>
+              </a:ext>
+            </a:extLst>
+          </p:cNvPr>
+          <p:cNvSpPr txBox="1"/>
+          <p:nvPr/>
+        </p:nvSpPr>
+        <p:spPr>
+          <a:xfrm>
+            <a:off x="10547201" y="1228319"/>
+            <a:ext cx="1634750" cy="2308324"/>
+          </a:xfrm>
+          <a:prstGeom prst="rect">
+            <a:avLst/>
+          </a:prstGeom>
+          <a:noFill/>
+        </p:spPr>
+        <p:txBody>
+          <a:bodyPr wrap="square" rtlCol="0">
+            <a:spAutoFit/>
+          </a:bodyPr>
+          <a:lstStyle/>
+          <a:p>
+            <a:r>
+              <a:rPr lang="en-US" b="1" dirty="0">
+                <a:solidFill>
+                  <a:srgbClr val="FF0000"/>
+                </a:solidFill>
+              </a:rPr>
+              <a:t>Alternative starts shown in different color font (starts by majority of programs show in black or white font)</a:t>
+            </a:r>
+          </a:p>
+        </p:txBody>
+      </p:sp>
+      <p:grpSp>
+        <p:nvGrpSpPr>
+          <p:cNvPr id="7" name="Group 6">
+            <a:extLst>
+              <a:ext uri="{FF2B5EF4-FFF2-40B4-BE49-F238E27FC236}">
+                <a16:creationId xmlns:a16="http://schemas.microsoft.com/office/drawing/2014/main" id="{E57B8E60-79CC-410A-8AC4-F626E31DEF5F}"/>
+              </a:ext>
+            </a:extLst>
+          </p:cNvPr>
+          <p:cNvGrpSpPr/>
+          <p:nvPr/>
+        </p:nvGrpSpPr>
+        <p:grpSpPr>
+          <a:xfrm>
+            <a:off x="537855" y="725907"/>
+            <a:ext cx="9978450" cy="5406186"/>
+            <a:chOff x="879115" y="777559"/>
+            <a:chExt cx="9978450" cy="5406186"/>
+          </a:xfrm>
+        </p:grpSpPr>
+        <p:pic>
+          <p:nvPicPr>
+            <p:cNvPr id="2" name="Picture 1">
+              <a:extLst>
+                <a:ext uri="{FF2B5EF4-FFF2-40B4-BE49-F238E27FC236}">
+                  <a16:creationId xmlns:a16="http://schemas.microsoft.com/office/drawing/2014/main" id="{19BF4FED-E28B-4EDB-9F9A-2C23CF81B0EF}"/>
+                </a:ext>
+              </a:extLst>
+            </p:cNvPr>
+            <p:cNvPicPr>
+              <a:picLocks noChangeAspect="1"/>
+            </p:cNvPicPr>
+            <p:nvPr/>
+          </p:nvPicPr>
+          <p:blipFill rotWithShape="1">
+            <a:blip r:embed="rId2"/>
+            <a:srcRect r="49840" b="36316"/>
+            <a:stretch/>
+          </p:blipFill>
+          <p:spPr>
+            <a:xfrm>
+              <a:off x="879115" y="777559"/>
+              <a:ext cx="9978450" cy="5302882"/>
+            </a:xfrm>
+            <a:prstGeom prst="rect">
+              <a:avLst/>
+            </a:prstGeom>
+          </p:spPr>
+        </p:pic>
+        <p:sp>
+          <p:nvSpPr>
+            <p:cNvPr id="5" name="Oval 4">
+              <a:extLst>
+                <a:ext uri="{FF2B5EF4-FFF2-40B4-BE49-F238E27FC236}">
+                  <a16:creationId xmlns:a16="http://schemas.microsoft.com/office/drawing/2014/main" id="{52626BFE-871F-4C8B-971C-BC434E631D3D}"/>
+                </a:ext>
+              </a:extLst>
+            </p:cNvPr>
+            <p:cNvSpPr/>
+            <p:nvPr/>
+          </p:nvSpPr>
+          <p:spPr>
+            <a:xfrm>
+              <a:off x="2510818" y="777559"/>
+              <a:ext cx="620309" cy="387927"/>
+            </a:xfrm>
+            <a:prstGeom prst="ellipse">
+              <a:avLst/>
+            </a:prstGeom>
+            <a:noFill/>
+            <a:ln w="57150">
+              <a:solidFill>
+                <a:srgbClr val="FF0000"/>
+              </a:solidFill>
+            </a:ln>
+          </p:spPr>
+          <p:style>
+            <a:lnRef idx="2">
+              <a:schemeClr val="accent1">
+                <a:shade val="50000"/>
+              </a:schemeClr>
+            </a:lnRef>
+            <a:fillRef idx="1">
+              <a:schemeClr val="accent1"/>
+            </a:fillRef>
+            <a:effectRef idx="0">
+              <a:schemeClr val="accent1"/>
+            </a:effectRef>
+            <a:fontRef idx="minor">
+              <a:schemeClr val="lt1"/>
+            </a:fontRef>
+          </p:style>
+          <p:txBody>
+            <a:bodyPr rtlCol="0" anchor="ctr"/>
+            <a:lstStyle/>
+            <a:p>
+              <a:pPr algn="ctr"/>
+              <a:endParaRPr lang="en-US"/>
+            </a:p>
+          </p:txBody>
+        </p:sp>
+        <p:sp>
+          <p:nvSpPr>
+            <p:cNvPr id="6" name="Oval 5">
+              <a:extLst>
+                <a:ext uri="{FF2B5EF4-FFF2-40B4-BE49-F238E27FC236}">
+                  <a16:creationId xmlns:a16="http://schemas.microsoft.com/office/drawing/2014/main" id="{550B40F2-81FA-490C-8BA3-8B05EC97D1EF}"/>
+                </a:ext>
+              </a:extLst>
+            </p:cNvPr>
+            <p:cNvSpPr/>
+            <p:nvPr/>
+          </p:nvSpPr>
+          <p:spPr>
+            <a:xfrm>
+              <a:off x="5092381" y="5795818"/>
+              <a:ext cx="620309" cy="387927"/>
+            </a:xfrm>
+            <a:prstGeom prst="ellipse">
+              <a:avLst/>
+            </a:prstGeom>
+            <a:noFill/>
+            <a:ln w="57150">
+              <a:solidFill>
+                <a:srgbClr val="FF0000"/>
+              </a:solidFill>
+            </a:ln>
+          </p:spPr>
+          <p:style>
+            <a:lnRef idx="2">
+              <a:schemeClr val="accent1">
+                <a:shade val="50000"/>
+              </a:schemeClr>
+            </a:lnRef>
+            <a:fillRef idx="1">
+              <a:schemeClr val="accent1"/>
+            </a:fillRef>
+            <a:effectRef idx="0">
+              <a:schemeClr val="accent1"/>
+            </a:effectRef>
+            <a:fontRef idx="minor">
+              <a:schemeClr val="lt1"/>
+            </a:fontRef>
+          </p:style>
+          <p:txBody>
+            <a:bodyPr rtlCol="0" anchor="ctr"/>
+            <a:lstStyle/>
+            <a:p>
+              <a:pPr algn="ctr"/>
+              <a:endParaRPr lang="en-US"/>
+            </a:p>
+          </p:txBody>
+        </p:sp>
+      </p:grpSp>
+    </p:spTree>
+    <p:extLst>
+      <p:ext uri="{BB962C8B-B14F-4D97-AF65-F5344CB8AC3E}">
+        <p14:creationId xmlns:p14="http://schemas.microsoft.com/office/powerpoint/2010/main" val="1622628439"/>
+      </p:ext>
+    </p:extLst>
+  </p:cSld>
+  <p:clrMapOvr>
+    <a:masterClrMapping/>
+  </p:clrMapOvr>
+</p:sld>
+</file>
+
+<file path=ppt/slides/slide9.xml><?xml version="1.0" encoding="utf-8"?>
 <p:sld xmlns:a="http://schemas.openxmlformats.org/drawingml/2006/main" xmlns:r="http://schemas.openxmlformats.org/officeDocument/2006/relationships" xmlns:p="http://schemas.openxmlformats.org/presentationml/2006/main">
   <p:cSld>
     <p:spTree>
@@ -6438,260 +6530,6 @@
     <p:extLst>
       <p:ext uri="{BB962C8B-B14F-4D97-AF65-F5344CB8AC3E}">
         <p14:creationId xmlns:p14="http://schemas.microsoft.com/office/powerpoint/2010/main" val="273132360"/>
-      </p:ext>
-    </p:extLst>
-  </p:cSld>
-  <p:clrMapOvr>
-    <a:masterClrMapping/>
-  </p:clrMapOvr>
-</p:sld>
-</file>
-
-<file path=ppt/slides/slide9.xml><?xml version="1.0" encoding="utf-8"?>
-<p:sld xmlns:a="http://schemas.openxmlformats.org/drawingml/2006/main" xmlns:r="http://schemas.openxmlformats.org/officeDocument/2006/relationships" xmlns:p="http://schemas.openxmlformats.org/presentationml/2006/main">
-  <p:cSld>
-    <p:spTree>
-      <p:nvGrpSpPr>
-        <p:cNvPr id="1" name=""/>
-        <p:cNvGrpSpPr/>
-        <p:nvPr/>
-      </p:nvGrpSpPr>
-      <p:grpSpPr>
-        <a:xfrm>
-          <a:off x="0" y="0"/>
-          <a:ext cx="0" cy="0"/>
-          <a:chOff x="0" y="0"/>
-          <a:chExt cx="0" cy="0"/>
-        </a:xfrm>
-      </p:grpSpPr>
-      <p:sp>
-        <p:nvSpPr>
-          <p:cNvPr id="2" name="Title 1">
-            <a:extLst>
-              <a:ext uri="{FF2B5EF4-FFF2-40B4-BE49-F238E27FC236}">
-                <a16:creationId xmlns:a16="http://schemas.microsoft.com/office/drawing/2014/main" id="{25E2BFF6-6BAD-4146-AEAE-1A9B27A484BD}"/>
-              </a:ext>
-            </a:extLst>
-          </p:cNvPr>
-          <p:cNvSpPr>
-            <a:spLocks noGrp="1"/>
-          </p:cNvSpPr>
-          <p:nvPr>
-            <p:ph type="title"/>
-          </p:nvPr>
-        </p:nvSpPr>
-        <p:spPr>
-          <a:xfrm>
-            <a:off x="1719618" y="365127"/>
-            <a:ext cx="8775510" cy="1325563"/>
-          </a:xfrm>
-        </p:spPr>
-        <p:txBody>
-          <a:bodyPr>
-            <a:normAutofit/>
-          </a:bodyPr>
-          <a:lstStyle/>
-          <a:p>
-            <a:pPr algn="ctr"/>
-            <a:r>
-              <a:rPr lang="en-US" dirty="0"/>
-              <a:t>Exporting Phage Commander Results</a:t>
-            </a:r>
-          </a:p>
-        </p:txBody>
-      </p:sp>
-      <p:sp>
-        <p:nvSpPr>
-          <p:cNvPr id="3" name="Content Placeholder 2">
-            <a:extLst>
-              <a:ext uri="{FF2B5EF4-FFF2-40B4-BE49-F238E27FC236}">
-                <a16:creationId xmlns:a16="http://schemas.microsoft.com/office/drawing/2014/main" id="{CE8EA6EE-0E6C-4A9E-8B64-0F376EC4BF94}"/>
-              </a:ext>
-            </a:extLst>
-          </p:cNvPr>
-          <p:cNvSpPr>
-            <a:spLocks noGrp="1"/>
-          </p:cNvSpPr>
-          <p:nvPr>
-            <p:ph idx="1"/>
-          </p:nvPr>
-        </p:nvSpPr>
-        <p:spPr>
-          <a:xfrm>
-            <a:off x="512465" y="1600200"/>
-            <a:ext cx="11284299" cy="5160819"/>
-          </a:xfrm>
-        </p:spPr>
-        <p:txBody>
-          <a:bodyPr>
-            <a:normAutofit fontScale="92500" lnSpcReduction="10000"/>
-          </a:bodyPr>
-          <a:lstStyle/>
-          <a:p>
-            <a:r>
-              <a:rPr lang="en-US" sz="3200" dirty="0"/>
-              <a:t>To export as excel spreadsheet, select:</a:t>
-            </a:r>
-          </a:p>
-          <a:p>
-            <a:pPr lvl="1"/>
-            <a:r>
-              <a:rPr lang="en-US" sz="2800" b="1" dirty="0">
-                <a:solidFill>
-                  <a:srgbClr val="0070C0"/>
-                </a:solidFill>
-              </a:rPr>
-              <a:t>File</a:t>
-            </a:r>
-            <a:r>
-              <a:rPr lang="en-US" sz="2800" dirty="0"/>
-              <a:t> </a:t>
-            </a:r>
-            <a:r>
-              <a:rPr lang="en-US" sz="2800" dirty="0">
-                <a:sym typeface="Wingdings" panose="05000000000000000000" pitchFamily="2" charset="2"/>
-              </a:rPr>
-              <a:t> </a:t>
-            </a:r>
-            <a:r>
-              <a:rPr lang="en-US" sz="2800" b="1" dirty="0">
-                <a:solidFill>
-                  <a:srgbClr val="0070C0"/>
-                </a:solidFill>
-                <a:sym typeface="Wingdings" panose="05000000000000000000" pitchFamily="2" charset="2"/>
-              </a:rPr>
-              <a:t>Export</a:t>
-            </a:r>
-            <a:r>
-              <a:rPr lang="en-US" sz="2800" dirty="0">
-                <a:sym typeface="Wingdings" panose="05000000000000000000" pitchFamily="2" charset="2"/>
-              </a:rPr>
-              <a:t>  </a:t>
-            </a:r>
-            <a:r>
-              <a:rPr lang="en-US" sz="2800" b="1" dirty="0">
-                <a:solidFill>
-                  <a:srgbClr val="0070C0"/>
-                </a:solidFill>
-                <a:sym typeface="Wingdings" panose="05000000000000000000" pitchFamily="2" charset="2"/>
-              </a:rPr>
-              <a:t>Excel</a:t>
-            </a:r>
-          </a:p>
-          <a:p>
-            <a:r>
-              <a:rPr lang="en-US" sz="3200" dirty="0">
-                <a:sym typeface="Wingdings" panose="05000000000000000000" pitchFamily="2" charset="2"/>
-              </a:rPr>
-              <a:t>To export as GenBank (.</a:t>
-            </a:r>
-            <a:r>
-              <a:rPr lang="en-US" sz="3200" dirty="0" err="1">
-                <a:sym typeface="Wingdings" panose="05000000000000000000" pitchFamily="2" charset="2"/>
-              </a:rPr>
-              <a:t>gb</a:t>
-            </a:r>
-            <a:r>
-              <a:rPr lang="en-US" sz="3200" dirty="0">
-                <a:sym typeface="Wingdings" panose="05000000000000000000" pitchFamily="2" charset="2"/>
-              </a:rPr>
-              <a:t>) format file, select:</a:t>
-            </a:r>
-          </a:p>
-          <a:p>
-            <a:pPr lvl="1"/>
-            <a:r>
-              <a:rPr lang="en-US" sz="2800" b="1" dirty="0">
-                <a:solidFill>
-                  <a:srgbClr val="0070C0"/>
-                </a:solidFill>
-                <a:sym typeface="Wingdings" panose="05000000000000000000" pitchFamily="2" charset="2"/>
-              </a:rPr>
-              <a:t>File</a:t>
-            </a:r>
-            <a:r>
-              <a:rPr lang="en-US" sz="2800" dirty="0">
-                <a:sym typeface="Wingdings" panose="05000000000000000000" pitchFamily="2" charset="2"/>
-              </a:rPr>
-              <a:t>  </a:t>
-            </a:r>
-            <a:r>
-              <a:rPr lang="en-US" sz="2800" b="1" dirty="0">
-                <a:solidFill>
-                  <a:srgbClr val="0070C0"/>
-                </a:solidFill>
-                <a:sym typeface="Wingdings" panose="05000000000000000000" pitchFamily="2" charset="2"/>
-              </a:rPr>
-              <a:t>Export</a:t>
-            </a:r>
-            <a:r>
-              <a:rPr lang="en-US" sz="2800" dirty="0">
-                <a:sym typeface="Wingdings" panose="05000000000000000000" pitchFamily="2" charset="2"/>
-              </a:rPr>
-              <a:t>  </a:t>
-            </a:r>
-            <a:r>
-              <a:rPr lang="en-US" sz="2800" b="1" dirty="0">
-                <a:solidFill>
-                  <a:srgbClr val="0070C0"/>
-                </a:solidFill>
-                <a:sym typeface="Wingdings" panose="05000000000000000000" pitchFamily="2" charset="2"/>
-              </a:rPr>
-              <a:t>GenBank</a:t>
-            </a:r>
-          </a:p>
-          <a:p>
-            <a:pPr lvl="1"/>
-            <a:r>
-              <a:rPr lang="en-US" sz="2800" dirty="0">
-                <a:sym typeface="Wingdings" panose="05000000000000000000" pitchFamily="2" charset="2"/>
-              </a:rPr>
-              <a:t>Set the threshold number of programs for exporting genes </a:t>
-            </a:r>
-          </a:p>
-          <a:p>
-            <a:pPr lvl="1"/>
-            <a:r>
-              <a:rPr lang="en-US" sz="2800" dirty="0">
-                <a:sym typeface="Wingdings" panose="05000000000000000000" pitchFamily="2" charset="2"/>
-              </a:rPr>
-              <a:t>“Less than or equal to” will export those genes identified by an equal or lower number of programs than the threshold (e.g. genes identified by 3 or fewer programs. Set the threshold to maximum to export all genes identified)</a:t>
-            </a:r>
-          </a:p>
-          <a:p>
-            <a:pPr lvl="1"/>
-            <a:r>
-              <a:rPr lang="en-US" sz="2800" dirty="0">
-                <a:sym typeface="Wingdings" panose="05000000000000000000" pitchFamily="2" charset="2"/>
-              </a:rPr>
-              <a:t>“Greater than” will export those genes identified by a number of programs greater than the threshold (e.g. genes identified by more than 2 programs. Use “0” as the threshold and this setting to export all genes identified)</a:t>
-            </a:r>
-          </a:p>
-          <a:p>
-            <a:pPr lvl="1"/>
-            <a:r>
-              <a:rPr lang="en-US" sz="2800" dirty="0">
-                <a:sym typeface="Wingdings" panose="05000000000000000000" pitchFamily="2" charset="2"/>
-              </a:rPr>
-              <a:t>Press “Save as” and enter desired filename</a:t>
-            </a:r>
-          </a:p>
-          <a:p>
-            <a:pPr lvl="1"/>
-            <a:r>
-              <a:rPr lang="en-US" sz="2800" dirty="0">
-                <a:sym typeface="Wingdings" panose="05000000000000000000" pitchFamily="2" charset="2"/>
-              </a:rPr>
-              <a:t>Press “Export”</a:t>
-            </a:r>
-            <a:endParaRPr lang="en-US" sz="2800" dirty="0"/>
-          </a:p>
-        </p:txBody>
-      </p:sp>
-    </p:spTree>
-    <p:extLst>
-      <p:ext uri="{BB962C8B-B14F-4D97-AF65-F5344CB8AC3E}">
-        <p14:creationId xmlns:p14="http://schemas.microsoft.com/office/powerpoint/2010/main" val="2722560293"/>
       </p:ext>
     </p:extLst>
   </p:cSld>

</xml_diff>